<commit_message>
- finalize integration slides - refactor - add pgadmin to docker-compose
</commit_message>
<xml_diff>
--- a/2_integration/T_Square_Integration_Slides.pptx
+++ b/2_integration/T_Square_Integration_Slides.pptx
@@ -7,23 +7,26 @@
     <p:sldMasterId id="2147483685" r:id="rId3"/>
   </p:sldMasterIdLst>
   <p:notesMasterIdLst>
-    <p:notesMasterId r:id="rId10"/>
+    <p:notesMasterId r:id="rId13"/>
   </p:notesMasterIdLst>
   <p:handoutMasterIdLst>
-    <p:handoutMasterId r:id="rId11"/>
+    <p:handoutMasterId r:id="rId14"/>
   </p:handoutMasterIdLst>
   <p:sldIdLst>
     <p:sldId id="352" r:id="rId4"/>
     <p:sldId id="535" r:id="rId5"/>
-    <p:sldId id="537" r:id="rId6"/>
-    <p:sldId id="538" r:id="rId7"/>
-    <p:sldId id="539" r:id="rId8"/>
-    <p:sldId id="540" r:id="rId9"/>
+    <p:sldId id="542" r:id="rId6"/>
+    <p:sldId id="541" r:id="rId7"/>
+    <p:sldId id="543" r:id="rId8"/>
+    <p:sldId id="537" r:id="rId9"/>
+    <p:sldId id="538" r:id="rId10"/>
+    <p:sldId id="539" r:id="rId11"/>
+    <p:sldId id="540" r:id="rId12"/>
   </p:sldIdLst>
   <p:sldSz cx="9144000" cy="5143500" type="screen16x9"/>
   <p:notesSz cx="6858000" cy="9144000"/>
   <p:custDataLst>
-    <p:tags r:id="rId12"/>
+    <p:tags r:id="rId15"/>
   </p:custDataLst>
   <p:defaultTextStyle>
     <a:defPPr>
@@ -358,7 +361,7 @@
             <a:fld id="{AA592FF2-A4BD-4E98-AC76-A10007E04C10}" type="datetimeFigureOut">
               <a:rPr lang="en-US" smtClean="0"/>
               <a:pPr/>
-              <a:t>6/6/2023</a:t>
+              <a:t>6/8/23</a:t>
             </a:fld>
             <a:endParaRPr lang="en-US" dirty="0"/>
           </a:p>
@@ -429,7 +432,7 @@
             <a:fld id="{4CBF50E3-ED67-46F2-ABFC-A36EE1082CF7}" type="slidenum">
               <a:rPr lang="en-US" b="1" smtClean="0"/>
               <a:pPr/>
-              <a:t>‹Nr.›</a:t>
+              <a:t>‹#›</a:t>
             </a:fld>
             <a:endParaRPr lang="en-US" b="1" dirty="0"/>
           </a:p>
@@ -1215,7 +1218,7 @@
             <a:fld id="{AA592FF2-A4BD-4E98-AC76-A10007E04C10}" type="datetimeFigureOut">
               <a:rPr lang="en-US" smtClean="0"/>
               <a:pPr/>
-              <a:t>6/6/2023</a:t>
+              <a:t>6/8/23</a:t>
             </a:fld>
             <a:endParaRPr lang="en-US" dirty="0"/>
           </a:p>
@@ -1376,7 +1379,7 @@
             <a:fld id="{4CBF50E3-ED67-46F2-ABFC-A36EE1082CF7}" type="slidenum">
               <a:rPr lang="en-US" b="1" smtClean="0"/>
               <a:pPr/>
-              <a:t>‹Nr.›</a:t>
+              <a:t>‹#›</a:t>
             </a:fld>
             <a:endParaRPr lang="en-US" b="1" dirty="0"/>
           </a:p>
@@ -3190,7 +3193,7 @@
             <a:fld id="{91D913BA-B0D8-4B51-9328-DFAA0B370309}" type="slidenum">
               <a:rPr lang="en-US" b="1" smtClean="0"/>
               <a:pPr/>
-              <a:t>‹Nr.›</a:t>
+              <a:t>‹#›</a:t>
             </a:fld>
             <a:endParaRPr lang="en-US" b="1" dirty="0"/>
           </a:p>
@@ -6065,7 +6068,7 @@
                 </a:solidFill>
               </a:rPr>
               <a:pPr/>
-              <a:t>‹Nr.›</a:t>
+              <a:t>‹#›</a:t>
             </a:fld>
             <a:endParaRPr lang="de-DE">
               <a:solidFill>
@@ -6302,7 +6305,7 @@
                 </a:solidFill>
               </a:rPr>
               <a:pPr/>
-              <a:t>‹Nr.›</a:t>
+              <a:t>‹#›</a:t>
             </a:fld>
             <a:endParaRPr lang="de-DE">
               <a:solidFill>
@@ -6522,7 +6525,7 @@
                 </a:solidFill>
               </a:rPr>
               <a:pPr/>
-              <a:t>‹Nr.›</a:t>
+              <a:t>‹#›</a:t>
             </a:fld>
             <a:endParaRPr lang="de-DE">
               <a:solidFill>
@@ -6837,7 +6840,7 @@
                 </a:solidFill>
               </a:rPr>
               <a:pPr/>
-              <a:t>‹Nr.›</a:t>
+              <a:t>‹#›</a:t>
             </a:fld>
             <a:endParaRPr lang="de-DE">
               <a:solidFill>
@@ -7579,7 +7582,7 @@
                 </a:solidFill>
               </a:rPr>
               <a:pPr/>
-              <a:t>‹Nr.›</a:t>
+              <a:t>‹#›</a:t>
             </a:fld>
             <a:endParaRPr lang="de-DE">
               <a:solidFill>
@@ -8773,7 +8776,7 @@
                 </a:solidFill>
               </a:rPr>
               <a:pPr/>
-              <a:t>‹Nr.›</a:t>
+              <a:t>‹#›</a:t>
             </a:fld>
             <a:endParaRPr lang="de-DE">
               <a:solidFill>
@@ -9099,7 +9102,7 @@
                 </a:solidFill>
               </a:rPr>
               <a:pPr/>
-              <a:t>‹Nr.›</a:t>
+              <a:t>‹#›</a:t>
             </a:fld>
             <a:endParaRPr lang="de-DE">
               <a:solidFill>
@@ -9425,7 +9428,7 @@
                 </a:solidFill>
               </a:rPr>
               <a:pPr/>
-              <a:t>‹Nr.›</a:t>
+              <a:t>‹#›</a:t>
             </a:fld>
             <a:endParaRPr lang="de-DE">
               <a:solidFill>
@@ -9751,7 +9754,7 @@
                 </a:solidFill>
               </a:rPr>
               <a:pPr/>
-              <a:t>‹Nr.›</a:t>
+              <a:t>‹#›</a:t>
             </a:fld>
             <a:endParaRPr lang="de-DE">
               <a:solidFill>
@@ -10009,7 +10012,7 @@
                 </a:solidFill>
               </a:rPr>
               <a:pPr/>
-              <a:t>‹Nr.›</a:t>
+              <a:t>‹#›</a:t>
             </a:fld>
             <a:endParaRPr lang="de-DE">
               <a:solidFill>
@@ -10488,7 +10491,7 @@
                 </a:solidFill>
               </a:rPr>
               <a:pPr/>
-              <a:t>‹Nr.›</a:t>
+              <a:t>‹#›</a:t>
             </a:fld>
             <a:endParaRPr lang="de-DE">
               <a:solidFill>
@@ -10672,7 +10675,7 @@
                 </a:solidFill>
               </a:rPr>
               <a:pPr/>
-              <a:t>‹Nr.›</a:t>
+              <a:t>‹#›</a:t>
             </a:fld>
             <a:endParaRPr lang="de-DE">
               <a:solidFill>
@@ -11432,7 +11435,7 @@
             <a:fld id="{91D913BA-B0D8-4B51-9328-DFAA0B370309}" type="slidenum">
               <a:rPr lang="en-US" b="1" smtClean="0"/>
               <a:pPr/>
-              <a:t>‹Nr.›</a:t>
+              <a:t>‹#›</a:t>
             </a:fld>
             <a:endParaRPr lang="en-US" b="1" dirty="0"/>
           </a:p>
@@ -13505,7 +13508,7 @@
                 </a:solidFill>
               </a:rPr>
               <a:pPr/>
-              <a:t>‹Nr.›</a:t>
+              <a:t>‹#›</a:t>
             </a:fld>
             <a:endParaRPr lang="de-DE">
               <a:solidFill>
@@ -13742,7 +13745,7 @@
                 </a:solidFill>
               </a:rPr>
               <a:pPr/>
-              <a:t>‹Nr.›</a:t>
+              <a:t>‹#›</a:t>
             </a:fld>
             <a:endParaRPr lang="de-DE">
               <a:solidFill>
@@ -13962,7 +13965,7 @@
                 </a:solidFill>
               </a:rPr>
               <a:pPr/>
-              <a:t>‹Nr.›</a:t>
+              <a:t>‹#›</a:t>
             </a:fld>
             <a:endParaRPr lang="de-DE">
               <a:solidFill>
@@ -14277,7 +14280,7 @@
                 </a:solidFill>
               </a:rPr>
               <a:pPr/>
-              <a:t>‹Nr.›</a:t>
+              <a:t>‹#›</a:t>
             </a:fld>
             <a:endParaRPr lang="de-DE">
               <a:solidFill>
@@ -14738,7 +14741,7 @@
                 </a:solidFill>
               </a:rPr>
               <a:pPr/>
-              <a:t>‹Nr.›</a:t>
+              <a:t>‹#›</a:t>
             </a:fld>
             <a:endParaRPr lang="de-DE">
               <a:solidFill>
@@ -15932,7 +15935,7 @@
                 </a:solidFill>
               </a:rPr>
               <a:pPr/>
-              <a:t>‹Nr.›</a:t>
+              <a:t>‹#›</a:t>
             </a:fld>
             <a:endParaRPr lang="de-DE">
               <a:solidFill>
@@ -16258,7 +16261,7 @@
                 </a:solidFill>
               </a:rPr>
               <a:pPr/>
-              <a:t>‹Nr.›</a:t>
+              <a:t>‹#›</a:t>
             </a:fld>
             <a:endParaRPr lang="de-DE">
               <a:solidFill>
@@ -16570,7 +16573,7 @@
             <a:fld id="{91D913BA-B0D8-4B51-9328-DFAA0B370309}" type="slidenum">
               <a:rPr lang="en-US" b="1" smtClean="0"/>
               <a:pPr/>
-              <a:t>‹Nr.›</a:t>
+              <a:t>‹#›</a:t>
             </a:fld>
             <a:endParaRPr lang="en-US" b="1" dirty="0"/>
           </a:p>
@@ -16839,7 +16842,7 @@
                 </a:solidFill>
               </a:rPr>
               <a:pPr/>
-              <a:t>‹Nr.›</a:t>
+              <a:t>‹#›</a:t>
             </a:fld>
             <a:endParaRPr lang="de-DE">
               <a:solidFill>
@@ -17165,7 +17168,7 @@
                 </a:solidFill>
               </a:rPr>
               <a:pPr/>
-              <a:t>‹Nr.›</a:t>
+              <a:t>‹#›</a:t>
             </a:fld>
             <a:endParaRPr lang="de-DE">
               <a:solidFill>
@@ -17423,7 +17426,7 @@
                 </a:solidFill>
               </a:rPr>
               <a:pPr/>
-              <a:t>‹Nr.›</a:t>
+              <a:t>‹#›</a:t>
             </a:fld>
             <a:endParaRPr lang="de-DE">
               <a:solidFill>
@@ -17880,7 +17883,7 @@
                 </a:solidFill>
               </a:rPr>
               <a:pPr/>
-              <a:t>‹Nr.›</a:t>
+              <a:t>‹#›</a:t>
             </a:fld>
             <a:endParaRPr lang="de-DE">
               <a:solidFill>
@@ -18064,7 +18067,7 @@
                 </a:solidFill>
               </a:rPr>
               <a:pPr/>
-              <a:t>‹Nr.›</a:t>
+              <a:t>‹#›</a:t>
             </a:fld>
             <a:endParaRPr lang="de-DE">
               <a:solidFill>
@@ -18336,7 +18339,7 @@
             <a:fld id="{91D913BA-B0D8-4B51-9328-DFAA0B370309}" type="slidenum">
               <a:rPr lang="en-US" smtClean="0"/>
               <a:pPr/>
-              <a:t>‹Nr.›</a:t>
+              <a:t>‹#›</a:t>
             </a:fld>
             <a:endParaRPr lang="en-US" dirty="0"/>
           </a:p>
@@ -18718,7 +18721,7 @@
             <a:fld id="{91D913BA-B0D8-4B51-9328-DFAA0B370309}" type="slidenum">
               <a:rPr lang="en-US" b="1" smtClean="0"/>
               <a:pPr/>
-              <a:t>‹Nr.›</a:t>
+              <a:t>‹#›</a:t>
             </a:fld>
             <a:endParaRPr lang="en-US" b="1" dirty="0"/>
           </a:p>
@@ -19013,7 +19016,7 @@
             <a:fld id="{91D913BA-B0D8-4B51-9328-DFAA0B370309}" type="slidenum">
               <a:rPr lang="en-US" b="1" smtClean="0"/>
               <a:pPr/>
-              <a:t>‹Nr.›</a:t>
+              <a:t>‹#›</a:t>
             </a:fld>
             <a:endParaRPr lang="en-US" b="1" dirty="0"/>
           </a:p>
@@ -19308,7 +19311,7 @@
             <a:fld id="{91D913BA-B0D8-4B51-9328-DFAA0B370309}" type="slidenum">
               <a:rPr lang="en-US" b="1" smtClean="0"/>
               <a:pPr/>
-              <a:t>‹Nr.›</a:t>
+              <a:t>‹#›</a:t>
             </a:fld>
             <a:endParaRPr lang="en-US" b="1" dirty="0"/>
           </a:p>
@@ -19603,7 +19606,7 @@
             <a:fld id="{91D913BA-B0D8-4B51-9328-DFAA0B370309}" type="slidenum">
               <a:rPr lang="en-US" b="1" smtClean="0"/>
               <a:pPr/>
-              <a:t>‹Nr.›</a:t>
+              <a:t>‹#›</a:t>
             </a:fld>
             <a:endParaRPr lang="en-US" b="1" dirty="0"/>
           </a:p>
@@ -19951,7 +19954,7 @@
             <a:fld id="{91D913BA-B0D8-4B51-9328-DFAA0B370309}" type="slidenum">
               <a:rPr lang="en-US" smtClean="0"/>
               <a:pPr/>
-              <a:t>‹Nr.›</a:t>
+              <a:t>‹#›</a:t>
             </a:fld>
             <a:endParaRPr lang="en-US" dirty="0"/>
           </a:p>
@@ -22099,7 +22102,7 @@
                   <a:spcPct val="0"/>
                 </a:spcAft>
               </a:pPr>
-              <a:t>‹Nr.›</a:t>
+              <a:t>‹#›</a:t>
             </a:fld>
             <a:endParaRPr lang="de-DE">
               <a:solidFill>
@@ -24387,7 +24390,7 @@
                   <a:spcPct val="0"/>
                 </a:spcAft>
               </a:pPr>
-              <a:t>‹Nr.›</a:t>
+              <a:t>‹#›</a:t>
             </a:fld>
             <a:endParaRPr lang="de-DE">
               <a:solidFill>
@@ -26859,6 +26862,32 @@
             </a:pPr>
             <a:r>
               <a:rPr lang="en-DE" sz="1000" dirty="0"/>
+              <a:t>Integrated Schema (ER Model)</a:t>
+            </a:r>
+          </a:p>
+          <a:p>
+            <a:pPr marL="228600" indent="-228600">
+              <a:lnSpc>
+                <a:spcPct val="100000"/>
+              </a:lnSpc>
+              <a:buFont typeface="+mj-lt"/>
+              <a:buAutoNum type="arabicPeriod"/>
+            </a:pPr>
+            <a:r>
+              <a:rPr lang="en-DE" sz="1000" dirty="0"/>
+              <a:t>Integration Pipeline Architecture</a:t>
+            </a:r>
+          </a:p>
+          <a:p>
+            <a:pPr marL="228600" indent="-228600">
+              <a:lnSpc>
+                <a:spcPct val="100000"/>
+              </a:lnSpc>
+              <a:buFont typeface="+mj-lt"/>
+              <a:buAutoNum type="arabicPeriod"/>
+            </a:pPr>
+            <a:r>
+              <a:rPr lang="en-DE" sz="1000" dirty="0"/>
               <a:t>Filling the DB and RMV tables</a:t>
             </a:r>
           </a:p>
@@ -27012,137 +27041,10 @@
       </p:grpSpPr>
       <p:sp>
         <p:nvSpPr>
-          <p:cNvPr id="2" name="Text Placeholder 1">
-            <a:extLst>
-              <a:ext uri="{FF2B5EF4-FFF2-40B4-BE49-F238E27FC236}">
-                <a16:creationId xmlns:a16="http://schemas.microsoft.com/office/drawing/2014/main" id="{B440AD28-38E4-367A-FF09-7005CDA60BE4}"/>
-              </a:ext>
-            </a:extLst>
-          </p:cNvPr>
-          <p:cNvSpPr>
-            <a:spLocks noGrp="1"/>
-          </p:cNvSpPr>
-          <p:nvPr>
-            <p:ph type="body" sz="quarter" idx="13"/>
-          </p:nvPr>
-        </p:nvSpPr>
-        <p:spPr/>
-        <p:txBody>
-          <a:bodyPr/>
-          <a:lstStyle/>
-          <a:p>
-            <a:pPr marL="285750" indent="-285750">
-              <a:buFont typeface="Arial,Sans-Serif"/>
-              <a:buChar char="•"/>
-            </a:pPr>
-            <a:r>
-              <a:rPr lang="en-GB" dirty="0"/>
-              <a:t>For each DB station we search for RMV stations in the same city</a:t>
-            </a:r>
-            <a:endParaRPr lang="en-GB">
-              <a:ea typeface="Verdana"/>
-            </a:endParaRPr>
-          </a:p>
-          <a:p>
-            <a:pPr marL="285750" indent="-285750">
-              <a:buFont typeface="Arial,Sans-Serif"/>
-              <a:buChar char="•"/>
-            </a:pPr>
-            <a:r>
-              <a:rPr lang="en-GB" dirty="0"/>
-              <a:t>One word city names like 'Marburg' are easy wins</a:t>
-            </a:r>
-            <a:endParaRPr lang="en-US"/>
-          </a:p>
-          <a:p>
-            <a:pPr marL="285750" indent="-285750">
-              <a:buFont typeface="Arial,Sans-Serif"/>
-              <a:buChar char="•"/>
-            </a:pPr>
-            <a:r>
-              <a:rPr lang="en-GB" dirty="0"/>
-              <a:t>Cities like 'Frankfurt </a:t>
-            </a:r>
-            <a:r>
-              <a:rPr lang="en-GB" dirty="0" err="1"/>
-              <a:t>a.M.</a:t>
-            </a:r>
-            <a:r>
-              <a:rPr lang="en-GB" dirty="0"/>
-              <a:t>' have different string representations</a:t>
-            </a:r>
-            <a:endParaRPr lang="en-US"/>
-          </a:p>
-          <a:p>
-            <a:pPr marL="285750" indent="-285750">
-              <a:buFont typeface="Arial,Sans-Serif"/>
-              <a:buChar char="•"/>
-            </a:pPr>
-            <a:r>
-              <a:rPr lang="en-GB" dirty="0"/>
-              <a:t>If no exact match is found candidates are searched and best is used</a:t>
-            </a:r>
-            <a:endParaRPr lang="en-US" dirty="0"/>
-          </a:p>
-          <a:p>
-            <a:pPr marL="359410" lvl="2" indent="-180340">
-              <a:buClr>
-                <a:srgbClr val="B1063A"/>
-              </a:buClr>
-              <a:buFont typeface="Arial,Sans-Serif"/>
-              <a:buChar char="•"/>
-            </a:pPr>
-            <a:r>
-              <a:rPr lang="en-GB" dirty="0"/>
-              <a:t>Candidates...</a:t>
-            </a:r>
-            <a:endParaRPr lang="en-US">
-              <a:ea typeface="Verdana"/>
-            </a:endParaRPr>
-          </a:p>
-          <a:p>
-            <a:pPr marL="537845" lvl="3" indent="-180340">
-              <a:buClr>
-                <a:srgbClr val="B1063A"/>
-              </a:buClr>
-              <a:buFont typeface="Arial,Sans-Serif"/>
-              <a:buChar char="•"/>
-            </a:pPr>
-            <a:r>
-              <a:rPr lang="en-GB" dirty="0"/>
-              <a:t>… have common 4 char prefix</a:t>
-            </a:r>
-            <a:endParaRPr lang="en-US" dirty="0">
-              <a:ea typeface="Verdana"/>
-            </a:endParaRPr>
-          </a:p>
-          <a:p>
-            <a:pPr marL="537845" lvl="3" indent="-180340">
-              <a:buFont typeface="Arial,Sans-Serif"/>
-              <a:buChar char="•"/>
-            </a:pPr>
-            <a:r>
-              <a:rPr lang="en-GB" dirty="0"/>
-              <a:t>… have a </a:t>
-            </a:r>
-            <a:r>
-              <a:rPr lang="en-GB" dirty="0" err="1"/>
-              <a:t>Levenshtein</a:t>
-            </a:r>
-            <a:r>
-              <a:rPr lang="en-GB" dirty="0"/>
-              <a:t> distance below 6</a:t>
-            </a:r>
-            <a:endParaRPr lang="en-US" dirty="0"/>
-          </a:p>
-        </p:txBody>
-      </p:sp>
-      <p:sp>
-        <p:nvSpPr>
           <p:cNvPr id="3" name="Title 2">
             <a:extLst>
               <a:ext uri="{FF2B5EF4-FFF2-40B4-BE49-F238E27FC236}">
-                <a16:creationId xmlns:a16="http://schemas.microsoft.com/office/drawing/2014/main" id="{F7F75A12-7548-59F4-2464-2142F1452B6E}"/>
+                <a16:creationId xmlns:a16="http://schemas.microsoft.com/office/drawing/2014/main" id="{A846E572-D41F-3160-8A51-EA210735B937}"/>
               </a:ext>
             </a:extLst>
           </p:cNvPr>
@@ -27159,42 +27061,52 @@
           <a:lstStyle/>
           <a:p>
             <a:r>
-              <a:rPr lang="de-DE" dirty="0"/>
-              <a:t>Clustering </a:t>
-            </a:r>
-            <a:r>
-              <a:rPr lang="de-DE" dirty="0" err="1"/>
-              <a:t>by</a:t>
-            </a:r>
-            <a:r>
-              <a:rPr lang="de-DE" dirty="0"/>
-              <a:t> </a:t>
-            </a:r>
-            <a:r>
-              <a:rPr lang="de-DE" dirty="0" err="1"/>
-              <a:t>city</a:t>
-            </a:r>
-            <a:r>
-              <a:rPr lang="de-DE" dirty="0"/>
-              <a:t> </a:t>
-            </a:r>
-            <a:r>
-              <a:rPr lang="de-DE" dirty="0" err="1"/>
-              <a:t>names</a:t>
-            </a:r>
-            <a:endParaRPr lang="en-US" dirty="0" err="1"/>
-          </a:p>
-          <a:p>
-            <a:endParaRPr lang="en-DE" dirty="0">
-              <a:ea typeface="Verdana"/>
-            </a:endParaRPr>
-          </a:p>
-        </p:txBody>
-      </p:sp>
+              <a:rPr lang="en-DE" sz="2000" dirty="0"/>
+              <a:t>Integrated Schema (ER Model)</a:t>
+            </a:r>
+            <a:endParaRPr lang="en-DE" dirty="0"/>
+          </a:p>
+        </p:txBody>
+      </p:sp>
+      <p:pic>
+        <p:nvPicPr>
+          <p:cNvPr id="8" name="Picture 7" descr="A screenshot of a computer&#10;&#10;Description automatically generated with medium confidence">
+            <a:extLst>
+              <a:ext uri="{FF2B5EF4-FFF2-40B4-BE49-F238E27FC236}">
+                <a16:creationId xmlns:a16="http://schemas.microsoft.com/office/drawing/2014/main" id="{59387364-4642-53F0-94B9-1EF68DB0DF5F}"/>
+              </a:ext>
+            </a:extLst>
+          </p:cNvPr>
+          <p:cNvPicPr>
+            <a:picLocks noChangeAspect="1"/>
+          </p:cNvPicPr>
+          <p:nvPr/>
+        </p:nvPicPr>
+        <p:blipFill rotWithShape="1">
+          <a:blip r:embed="rId2">
+            <a:extLst>
+              <a:ext uri="{28A0092B-C50C-407E-A947-70E740481C1C}">
+                <a14:useLocalDpi xmlns:a14="http://schemas.microsoft.com/office/drawing/2010/main" val="0"/>
+              </a:ext>
+            </a:extLst>
+          </a:blip>
+          <a:srcRect r="58309" b="33084"/>
+          <a:stretch/>
+        </p:blipFill>
+        <p:spPr>
+          <a:xfrm>
+            <a:off x="2267744" y="1203598"/>
+            <a:ext cx="4032448" cy="3674008"/>
+          </a:xfrm>
+          <a:prstGeom prst="rect">
+            <a:avLst/>
+          </a:prstGeom>
+        </p:spPr>
+      </p:pic>
     </p:spTree>
     <p:extLst>
       <p:ext uri="{BB962C8B-B14F-4D97-AF65-F5344CB8AC3E}">
-        <p14:creationId xmlns:p14="http://schemas.microsoft.com/office/powerpoint/2010/main" val="198905625"/>
+        <p14:creationId xmlns:p14="http://schemas.microsoft.com/office/powerpoint/2010/main" val="2747792959"/>
       </p:ext>
     </p:extLst>
   </p:cSld>
@@ -27223,6 +27135,1894 @@
       </p:grpSpPr>
       <p:sp>
         <p:nvSpPr>
+          <p:cNvPr id="3" name="Title 2">
+            <a:extLst>
+              <a:ext uri="{FF2B5EF4-FFF2-40B4-BE49-F238E27FC236}">
+                <a16:creationId xmlns:a16="http://schemas.microsoft.com/office/drawing/2014/main" id="{F7F75A12-7548-59F4-2464-2142F1452B6E}"/>
+              </a:ext>
+            </a:extLst>
+          </p:cNvPr>
+          <p:cNvSpPr>
+            <a:spLocks noGrp="1"/>
+          </p:cNvSpPr>
+          <p:nvPr>
+            <p:ph type="title"/>
+          </p:nvPr>
+        </p:nvSpPr>
+        <p:spPr/>
+        <p:txBody>
+          <a:bodyPr/>
+          <a:lstStyle/>
+          <a:p>
+            <a:pPr>
+              <a:lnSpc>
+                <a:spcPct val="100000"/>
+              </a:lnSpc>
+            </a:pPr>
+            <a:r>
+              <a:rPr lang="en-DE" sz="2000" dirty="0"/>
+              <a:t>Integration Pipeline Architecture</a:t>
+            </a:r>
+          </a:p>
+        </p:txBody>
+      </p:sp>
+      <p:pic>
+        <p:nvPicPr>
+          <p:cNvPr id="10" name="Graphic 9">
+            <a:extLst>
+              <a:ext uri="{FF2B5EF4-FFF2-40B4-BE49-F238E27FC236}">
+                <a16:creationId xmlns:a16="http://schemas.microsoft.com/office/drawing/2014/main" id="{717E959A-7514-8494-F57C-AF289B9B2884}"/>
+              </a:ext>
+            </a:extLst>
+          </p:cNvPr>
+          <p:cNvPicPr>
+            <a:picLocks noChangeAspect="1"/>
+          </p:cNvPicPr>
+          <p:nvPr/>
+        </p:nvPicPr>
+        <p:blipFill>
+          <a:blip r:embed="rId2">
+            <a:extLst>
+              <a:ext uri="{28A0092B-C50C-407E-A947-70E740481C1C}">
+                <a14:useLocalDpi xmlns:a14="http://schemas.microsoft.com/office/drawing/2010/main" val="0"/>
+              </a:ext>
+              <a:ext uri="{96DAC541-7B7A-43D3-8B79-37D633B846F1}">
+                <asvg:svgBlip xmlns:asvg="http://schemas.microsoft.com/office/drawing/2016/SVG/main" r:embed="rId3"/>
+              </a:ext>
+            </a:extLst>
+          </a:blip>
+          <a:stretch>
+            <a:fillRect/>
+          </a:stretch>
+        </p:blipFill>
+        <p:spPr>
+          <a:xfrm>
+            <a:off x="7127314" y="1167594"/>
+            <a:ext cx="792088" cy="792088"/>
+          </a:xfrm>
+          <a:prstGeom prst="rect">
+            <a:avLst/>
+          </a:prstGeom>
+        </p:spPr>
+      </p:pic>
+      <p:pic>
+        <p:nvPicPr>
+          <p:cNvPr id="12" name="Graphic 11">
+            <a:extLst>
+              <a:ext uri="{FF2B5EF4-FFF2-40B4-BE49-F238E27FC236}">
+                <a16:creationId xmlns:a16="http://schemas.microsoft.com/office/drawing/2014/main" id="{47264334-B503-55ED-ACA1-56BDD5F6356A}"/>
+              </a:ext>
+            </a:extLst>
+          </p:cNvPr>
+          <p:cNvPicPr>
+            <a:picLocks noChangeAspect="1"/>
+          </p:cNvPicPr>
+          <p:nvPr/>
+        </p:nvPicPr>
+        <p:blipFill>
+          <a:blip r:embed="rId4">
+            <a:extLst>
+              <a:ext uri="{28A0092B-C50C-407E-A947-70E740481C1C}">
+                <a14:useLocalDpi xmlns:a14="http://schemas.microsoft.com/office/drawing/2010/main" val="0"/>
+              </a:ext>
+              <a:ext uri="{96DAC541-7B7A-43D3-8B79-37D633B846F1}">
+                <asvg:svgBlip xmlns:asvg="http://schemas.microsoft.com/office/drawing/2016/SVG/main" r:embed="rId5"/>
+              </a:ext>
+            </a:extLst>
+          </a:blip>
+          <a:stretch>
+            <a:fillRect/>
+          </a:stretch>
+        </p:blipFill>
+        <p:spPr>
+          <a:xfrm>
+            <a:off x="6732240" y="1607333"/>
+            <a:ext cx="265908" cy="504056"/>
+          </a:xfrm>
+          <a:prstGeom prst="rect">
+            <a:avLst/>
+          </a:prstGeom>
+        </p:spPr>
+      </p:pic>
+      <p:pic>
+        <p:nvPicPr>
+          <p:cNvPr id="14" name="Picture 13">
+            <a:extLst>
+              <a:ext uri="{FF2B5EF4-FFF2-40B4-BE49-F238E27FC236}">
+                <a16:creationId xmlns:a16="http://schemas.microsoft.com/office/drawing/2014/main" id="{DF7E73AA-DBA0-54FA-2003-CC6DD95D78EB}"/>
+              </a:ext>
+            </a:extLst>
+          </p:cNvPr>
+          <p:cNvPicPr>
+            <a:picLocks noChangeAspect="1"/>
+          </p:cNvPicPr>
+          <p:nvPr/>
+        </p:nvPicPr>
+        <p:blipFill>
+          <a:blip r:embed="rId6"/>
+          <a:stretch>
+            <a:fillRect/>
+          </a:stretch>
+        </p:blipFill>
+        <p:spPr>
+          <a:xfrm>
+            <a:off x="481953" y="1563638"/>
+            <a:ext cx="5011744" cy="2244424"/>
+          </a:xfrm>
+          <a:prstGeom prst="rect">
+            <a:avLst/>
+          </a:prstGeom>
+        </p:spPr>
+      </p:pic>
+      <p:pic>
+        <p:nvPicPr>
+          <p:cNvPr id="15" name="Picture 14">
+            <a:extLst>
+              <a:ext uri="{FF2B5EF4-FFF2-40B4-BE49-F238E27FC236}">
+                <a16:creationId xmlns:a16="http://schemas.microsoft.com/office/drawing/2014/main" id="{1CB97B92-1C4E-E127-B92E-61AB4C0AF5A0}"/>
+              </a:ext>
+            </a:extLst>
+          </p:cNvPr>
+          <p:cNvPicPr>
+            <a:picLocks noChangeAspect="1"/>
+          </p:cNvPicPr>
+          <p:nvPr/>
+        </p:nvPicPr>
+        <p:blipFill>
+          <a:blip r:embed="rId7"/>
+          <a:stretch>
+            <a:fillRect/>
+          </a:stretch>
+        </p:blipFill>
+        <p:spPr>
+          <a:xfrm>
+            <a:off x="4806878" y="2783454"/>
+            <a:ext cx="2964503" cy="1732677"/>
+          </a:xfrm>
+          <a:prstGeom prst="rect">
+            <a:avLst/>
+          </a:prstGeom>
+          <a:ln>
+            <a:solidFill>
+              <a:schemeClr val="tx1"/>
+            </a:solidFill>
+          </a:ln>
+        </p:spPr>
+      </p:pic>
+    </p:spTree>
+    <p:extLst>
+      <p:ext uri="{BB962C8B-B14F-4D97-AF65-F5344CB8AC3E}">
+        <p14:creationId xmlns:p14="http://schemas.microsoft.com/office/powerpoint/2010/main" val="1688948976"/>
+      </p:ext>
+    </p:extLst>
+  </p:cSld>
+  <p:clrMapOvr>
+    <a:masterClrMapping/>
+  </p:clrMapOvr>
+</p:sld>
+</file>
+
+<file path=ppt/slides/slide5.xml><?xml version="1.0" encoding="utf-8"?>
+<p:sld xmlns:a="http://schemas.openxmlformats.org/drawingml/2006/main" xmlns:r="http://schemas.openxmlformats.org/officeDocument/2006/relationships" xmlns:p="http://schemas.openxmlformats.org/presentationml/2006/main">
+  <p:cSld>
+    <p:spTree>
+      <p:nvGrpSpPr>
+        <p:cNvPr id="1" name=""/>
+        <p:cNvGrpSpPr/>
+        <p:nvPr/>
+      </p:nvGrpSpPr>
+      <p:grpSpPr>
+        <a:xfrm>
+          <a:off x="0" y="0"/>
+          <a:ext cx="0" cy="0"/>
+          <a:chOff x="0" y="0"/>
+          <a:chExt cx="0" cy="0"/>
+        </a:xfrm>
+      </p:grpSpPr>
+      <p:sp>
+        <p:nvSpPr>
+          <p:cNvPr id="3" name="Title 2">
+            <a:extLst>
+              <a:ext uri="{FF2B5EF4-FFF2-40B4-BE49-F238E27FC236}">
+                <a16:creationId xmlns:a16="http://schemas.microsoft.com/office/drawing/2014/main" id="{F7F75A12-7548-59F4-2464-2142F1452B6E}"/>
+              </a:ext>
+            </a:extLst>
+          </p:cNvPr>
+          <p:cNvSpPr>
+            <a:spLocks noGrp="1"/>
+          </p:cNvSpPr>
+          <p:nvPr>
+            <p:ph type="title"/>
+          </p:nvPr>
+        </p:nvSpPr>
+        <p:spPr/>
+        <p:txBody>
+          <a:bodyPr/>
+          <a:lstStyle/>
+          <a:p>
+            <a:r>
+              <a:rPr lang="en-DE" dirty="0"/>
+              <a:t>Filling the DB and RMV tables</a:t>
+            </a:r>
+            <a:br>
+              <a:rPr lang="en-DE" dirty="0"/>
+            </a:br>
+            <a:r>
+              <a:rPr lang="en-DE" dirty="0"/>
+              <a:t>through mapping / calculating the relevant attributes</a:t>
+            </a:r>
+          </a:p>
+        </p:txBody>
+      </p:sp>
+      <p:graphicFrame>
+        <p:nvGraphicFramePr>
+          <p:cNvPr id="6" name="Tabelle 4">
+            <a:extLst>
+              <a:ext uri="{FF2B5EF4-FFF2-40B4-BE49-F238E27FC236}">
+                <a16:creationId xmlns:a16="http://schemas.microsoft.com/office/drawing/2014/main" id="{01B4EC83-4A4B-90AF-EFA8-563089111670}"/>
+              </a:ext>
+            </a:extLst>
+          </p:cNvPr>
+          <p:cNvGraphicFramePr>
+            <a:graphicFrameLocks noGrp="1"/>
+          </p:cNvGraphicFramePr>
+          <p:nvPr/>
+        </p:nvGraphicFramePr>
+        <p:xfrm>
+          <a:off x="3995471" y="1141311"/>
+          <a:ext cx="3240360" cy="3017520"/>
+        </p:xfrm>
+        <a:graphic>
+          <a:graphicData uri="http://schemas.openxmlformats.org/drawingml/2006/table">
+            <a:tbl>
+              <a:tblPr firstRow="1" bandRow="1">
+                <a:tableStyleId>{E929F9F4-4A8F-4326-A1B4-22849713DDAB}</a:tableStyleId>
+              </a:tblPr>
+              <a:tblGrid>
+                <a:gridCol w="1296144">
+                  <a:extLst>
+                    <a:ext uri="{9D8B030D-6E8A-4147-A177-3AD203B41FA5}">
+                      <a16:colId xmlns:a16="http://schemas.microsoft.com/office/drawing/2014/main" val="726253425"/>
+                    </a:ext>
+                  </a:extLst>
+                </a:gridCol>
+                <a:gridCol w="1944216">
+                  <a:extLst>
+                    <a:ext uri="{9D8B030D-6E8A-4147-A177-3AD203B41FA5}">
+                      <a16:colId xmlns:a16="http://schemas.microsoft.com/office/drawing/2014/main" val="3954886685"/>
+                    </a:ext>
+                  </a:extLst>
+                </a:gridCol>
+              </a:tblGrid>
+              <a:tr h="216024">
+                <a:tc>
+                  <a:txBody>
+                    <a:bodyPr/>
+                    <a:lstStyle/>
+                    <a:p>
+                      <a:pPr lvl="0">
+                        <a:buNone/>
+                      </a:pPr>
+                      <a:r>
+                        <a:rPr lang="de-DE" sz="1100" dirty="0"/>
+                        <a:t>DB Station </a:t>
+                      </a:r>
+                      <a:r>
+                        <a:rPr lang="de-DE" sz="1100" dirty="0">
+                          <a:sym typeface="Wingdings" pitchFamily="2" charset="2"/>
+                        </a:rPr>
+                        <a:t></a:t>
+                      </a:r>
+                      <a:endParaRPr lang="de-DE" sz="1100" dirty="0"/>
+                    </a:p>
+                  </a:txBody>
+                  <a:tcPr/>
+                </a:tc>
+                <a:tc>
+                  <a:txBody>
+                    <a:bodyPr/>
+                    <a:lstStyle/>
+                    <a:p>
+                      <a:r>
+                        <a:rPr lang="de-DE" sz="1100" dirty="0"/>
+                        <a:t>Integrated DB Station</a:t>
+                      </a:r>
+                    </a:p>
+                  </a:txBody>
+                  <a:tcPr/>
+                </a:tc>
+                <a:extLst>
+                  <a:ext uri="{0D108BD9-81ED-4DB2-BD59-A6C34878D82A}">
+                    <a16:rowId xmlns:a16="http://schemas.microsoft.com/office/drawing/2014/main" val="747663864"/>
+                  </a:ext>
+                </a:extLst>
+              </a:tr>
+              <a:tr h="0">
+                <a:tc>
+                  <a:txBody>
+                    <a:bodyPr/>
+                    <a:lstStyle/>
+                    <a:p>
+                      <a:pPr lvl="0">
+                        <a:buNone/>
+                      </a:pPr>
+                      <a:r>
+                        <a:rPr lang="en-GB" sz="1100" kern="1200" dirty="0" err="1">
+                          <a:solidFill>
+                            <a:schemeClr val="lt1"/>
+                          </a:solidFill>
+                          <a:effectLst/>
+                          <a:latin typeface="+mn-lt"/>
+                          <a:ea typeface="+mn-ea"/>
+                          <a:cs typeface="+mn-cs"/>
+                        </a:rPr>
+                        <a:t>evaNr</a:t>
+                      </a:r>
+                      <a:endParaRPr lang="de-DE" sz="1100" dirty="0"/>
+                    </a:p>
+                  </a:txBody>
+                  <a:tcPr/>
+                </a:tc>
+                <a:tc>
+                  <a:txBody>
+                    <a:bodyPr/>
+                    <a:lstStyle/>
+                    <a:p>
+                      <a:pPr lvl="0">
+                        <a:buNone/>
+                      </a:pPr>
+                      <a:r>
+                        <a:rPr lang="de-DE" sz="1100" dirty="0" err="1"/>
+                        <a:t>stationId</a:t>
+                      </a:r>
+                      <a:endParaRPr lang="de-DE" sz="1100" dirty="0"/>
+                    </a:p>
+                  </a:txBody>
+                  <a:tcPr/>
+                </a:tc>
+                <a:extLst>
+                  <a:ext uri="{0D108BD9-81ED-4DB2-BD59-A6C34878D82A}">
+                    <a16:rowId xmlns:a16="http://schemas.microsoft.com/office/drawing/2014/main" val="4074611531"/>
+                  </a:ext>
+                </a:extLst>
+              </a:tr>
+              <a:tr h="0">
+                <a:tc>
+                  <a:txBody>
+                    <a:bodyPr/>
+                    <a:lstStyle/>
+                    <a:p>
+                      <a:pPr lvl="0">
+                        <a:buNone/>
+                      </a:pPr>
+                      <a:r>
+                        <a:rPr lang="en-GB" sz="1100" kern="1200" dirty="0">
+                          <a:solidFill>
+                            <a:schemeClr val="lt1"/>
+                          </a:solidFill>
+                          <a:effectLst/>
+                          <a:latin typeface="+mn-lt"/>
+                          <a:ea typeface="+mn-ea"/>
+                          <a:cs typeface="+mn-cs"/>
+                        </a:rPr>
+                        <a:t>ds100</a:t>
+                      </a:r>
+                      <a:endParaRPr lang="de-DE" sz="1100" dirty="0"/>
+                    </a:p>
+                  </a:txBody>
+                  <a:tcPr/>
+                </a:tc>
+                <a:tc>
+                  <a:txBody>
+                    <a:bodyPr/>
+                    <a:lstStyle/>
+                    <a:p>
+                      <a:pPr lvl="0">
+                        <a:buNone/>
+                      </a:pPr>
+                      <a:endParaRPr lang="de-DE" sz="1100" dirty="0"/>
+                    </a:p>
+                  </a:txBody>
+                  <a:tcPr/>
+                </a:tc>
+                <a:extLst>
+                  <a:ext uri="{0D108BD9-81ED-4DB2-BD59-A6C34878D82A}">
+                    <a16:rowId xmlns:a16="http://schemas.microsoft.com/office/drawing/2014/main" val="2152975387"/>
+                  </a:ext>
+                </a:extLst>
+              </a:tr>
+              <a:tr h="158864">
+                <a:tc>
+                  <a:txBody>
+                    <a:bodyPr/>
+                    <a:lstStyle/>
+                    <a:p>
+                      <a:pPr lvl="0">
+                        <a:buNone/>
+                      </a:pPr>
+                      <a:r>
+                        <a:rPr lang="en-GB" sz="1100" kern="1200" dirty="0" err="1">
+                          <a:solidFill>
+                            <a:schemeClr val="lt1"/>
+                          </a:solidFill>
+                          <a:effectLst/>
+                          <a:latin typeface="+mn-lt"/>
+                          <a:ea typeface="+mn-ea"/>
+                          <a:cs typeface="+mn-cs"/>
+                        </a:rPr>
+                        <a:t>ifopt</a:t>
+                      </a:r>
+                      <a:endParaRPr lang="en-GB" sz="1100" kern="1200" dirty="0">
+                        <a:solidFill>
+                          <a:schemeClr val="lt1"/>
+                        </a:solidFill>
+                        <a:effectLst/>
+                        <a:latin typeface="+mn-lt"/>
+                        <a:ea typeface="+mn-ea"/>
+                        <a:cs typeface="+mn-cs"/>
+                      </a:endParaRPr>
+                    </a:p>
+                  </a:txBody>
+                  <a:tcPr/>
+                </a:tc>
+                <a:tc>
+                  <a:txBody>
+                    <a:bodyPr/>
+                    <a:lstStyle/>
+                    <a:p>
+                      <a:pPr lvl="0">
+                        <a:buNone/>
+                      </a:pPr>
+                      <a:endParaRPr lang="de-DE" sz="1100" dirty="0"/>
+                    </a:p>
+                  </a:txBody>
+                  <a:tcPr/>
+                </a:tc>
+                <a:extLst>
+                  <a:ext uri="{0D108BD9-81ED-4DB2-BD59-A6C34878D82A}">
+                    <a16:rowId xmlns:a16="http://schemas.microsoft.com/office/drawing/2014/main" val="3195943143"/>
+                  </a:ext>
+                </a:extLst>
+              </a:tr>
+              <a:tr h="158864">
+                <a:tc>
+                  <a:txBody>
+                    <a:bodyPr/>
+                    <a:lstStyle/>
+                    <a:p>
+                      <a:pPr marL="0" marR="0" lvl="0" indent="0" algn="l" defTabSz="914310" rtl="0" eaLnBrk="1" fontAlgn="auto" latinLnBrk="0" hangingPunct="1">
+                        <a:lnSpc>
+                          <a:spcPct val="100000"/>
+                        </a:lnSpc>
+                        <a:spcBef>
+                          <a:spcPts val="0"/>
+                        </a:spcBef>
+                        <a:spcAft>
+                          <a:spcPts val="0"/>
+                        </a:spcAft>
+                        <a:buClrTx/>
+                        <a:buSzTx/>
+                        <a:buFontTx/>
+                        <a:buNone/>
+                        <a:tabLst/>
+                        <a:defRPr/>
+                      </a:pPr>
+                      <a:r>
+                        <a:rPr lang="en-GB" sz="1100" kern="1200" dirty="0">
+                          <a:solidFill>
+                            <a:schemeClr val="lt1"/>
+                          </a:solidFill>
+                          <a:effectLst/>
+                          <a:latin typeface="+mn-lt"/>
+                          <a:ea typeface="+mn-ea"/>
+                          <a:cs typeface="+mn-cs"/>
+                        </a:rPr>
+                        <a:t>name</a:t>
+                      </a:r>
+                    </a:p>
+                  </a:txBody>
+                  <a:tcPr/>
+                </a:tc>
+                <a:tc>
+                  <a:txBody>
+                    <a:bodyPr/>
+                    <a:lstStyle/>
+                    <a:p>
+                      <a:pPr marL="0" marR="0" lvl="0" indent="0" algn="l" defTabSz="914310" rtl="0" eaLnBrk="1" fontAlgn="auto" latinLnBrk="0" hangingPunct="1">
+                        <a:lnSpc>
+                          <a:spcPct val="100000"/>
+                        </a:lnSpc>
+                        <a:spcBef>
+                          <a:spcPts val="0"/>
+                        </a:spcBef>
+                        <a:spcAft>
+                          <a:spcPts val="0"/>
+                        </a:spcAft>
+                        <a:buClrTx/>
+                        <a:buSzTx/>
+                        <a:buFontTx/>
+                        <a:buNone/>
+                        <a:tabLst/>
+                        <a:defRPr/>
+                      </a:pPr>
+                      <a:r>
+                        <a:rPr lang="de-DE" sz="1100" dirty="0" err="1"/>
+                        <a:t>stationName</a:t>
+                      </a:r>
+                      <a:r>
+                        <a:rPr lang="de-DE" sz="1100" dirty="0"/>
+                        <a:t>, </a:t>
+                      </a:r>
+                      <a:r>
+                        <a:rPr lang="de-DE" sz="1100" dirty="0" err="1"/>
+                        <a:t>cityName</a:t>
+                      </a:r>
+                      <a:r>
+                        <a:rPr lang="de-DE" sz="1100" dirty="0"/>
+                        <a:t> (</a:t>
+                      </a:r>
+                      <a:r>
+                        <a:rPr lang="de-DE" sz="1100" dirty="0" err="1"/>
+                        <a:t>extracted</a:t>
+                      </a:r>
+                      <a:r>
+                        <a:rPr lang="de-DE" sz="1100" dirty="0"/>
+                        <a:t> </a:t>
+                      </a:r>
+                      <a:r>
+                        <a:rPr lang="de-DE" sz="1100" dirty="0" err="1"/>
+                        <a:t>from</a:t>
+                      </a:r>
+                      <a:r>
+                        <a:rPr lang="de-DE" sz="1100" dirty="0"/>
+                        <a:t> </a:t>
+                      </a:r>
+                      <a:r>
+                        <a:rPr lang="de-DE" sz="1100" dirty="0" err="1"/>
+                        <a:t>name</a:t>
+                      </a:r>
+                      <a:r>
+                        <a:rPr lang="de-DE" sz="1100" dirty="0"/>
+                        <a:t>)</a:t>
+                      </a:r>
+                    </a:p>
+                  </a:txBody>
+                  <a:tcPr/>
+                </a:tc>
+                <a:extLst>
+                  <a:ext uri="{0D108BD9-81ED-4DB2-BD59-A6C34878D82A}">
+                    <a16:rowId xmlns:a16="http://schemas.microsoft.com/office/drawing/2014/main" val="1993862976"/>
+                  </a:ext>
+                </a:extLst>
+              </a:tr>
+              <a:tr h="158864">
+                <a:tc>
+                  <a:txBody>
+                    <a:bodyPr/>
+                    <a:lstStyle/>
+                    <a:p>
+                      <a:pPr marL="0" marR="0" lvl="0" indent="0" algn="l" defTabSz="914310" rtl="0" eaLnBrk="1" fontAlgn="auto" latinLnBrk="0" hangingPunct="1">
+                        <a:lnSpc>
+                          <a:spcPct val="100000"/>
+                        </a:lnSpc>
+                        <a:spcBef>
+                          <a:spcPts val="0"/>
+                        </a:spcBef>
+                        <a:spcAft>
+                          <a:spcPts val="0"/>
+                        </a:spcAft>
+                        <a:buClrTx/>
+                        <a:buSzTx/>
+                        <a:buFontTx/>
+                        <a:buNone/>
+                        <a:tabLst/>
+                        <a:defRPr/>
+                      </a:pPr>
+                      <a:r>
+                        <a:rPr lang="en-GB" sz="1100" kern="1200" dirty="0" err="1">
+                          <a:solidFill>
+                            <a:schemeClr val="lt1"/>
+                          </a:solidFill>
+                          <a:effectLst/>
+                          <a:latin typeface="+mn-lt"/>
+                          <a:ea typeface="+mn-ea"/>
+                          <a:cs typeface="+mn-cs"/>
+                        </a:rPr>
+                        <a:t>verkehr</a:t>
+                      </a:r>
+                      <a:endParaRPr lang="en-GB" sz="1100" kern="1200" dirty="0">
+                        <a:solidFill>
+                          <a:schemeClr val="lt1"/>
+                        </a:solidFill>
+                        <a:effectLst/>
+                        <a:latin typeface="+mn-lt"/>
+                        <a:ea typeface="+mn-ea"/>
+                        <a:cs typeface="+mn-cs"/>
+                      </a:endParaRPr>
+                    </a:p>
+                  </a:txBody>
+                  <a:tcPr/>
+                </a:tc>
+                <a:tc>
+                  <a:txBody>
+                    <a:bodyPr/>
+                    <a:lstStyle/>
+                    <a:p>
+                      <a:pPr lvl="0">
+                        <a:buNone/>
+                      </a:pPr>
+                      <a:endParaRPr lang="de-DE" sz="1100" dirty="0"/>
+                    </a:p>
+                  </a:txBody>
+                  <a:tcPr/>
+                </a:tc>
+                <a:extLst>
+                  <a:ext uri="{0D108BD9-81ED-4DB2-BD59-A6C34878D82A}">
+                    <a16:rowId xmlns:a16="http://schemas.microsoft.com/office/drawing/2014/main" val="271117908"/>
+                  </a:ext>
+                </a:extLst>
+              </a:tr>
+              <a:tr h="158864">
+                <a:tc>
+                  <a:txBody>
+                    <a:bodyPr/>
+                    <a:lstStyle/>
+                    <a:p>
+                      <a:pPr lvl="0">
+                        <a:buNone/>
+                      </a:pPr>
+                      <a:r>
+                        <a:rPr lang="en-GB" sz="1100" kern="1200" dirty="0" err="1">
+                          <a:solidFill>
+                            <a:schemeClr val="lt1"/>
+                          </a:solidFill>
+                          <a:effectLst/>
+                          <a:latin typeface="+mn-lt"/>
+                          <a:ea typeface="+mn-ea"/>
+                          <a:cs typeface="+mn-cs"/>
+                        </a:rPr>
+                        <a:t>laenge</a:t>
+                      </a:r>
+                      <a:endParaRPr lang="en-GB" sz="1100" kern="1200" dirty="0">
+                        <a:solidFill>
+                          <a:schemeClr val="lt1"/>
+                        </a:solidFill>
+                        <a:effectLst/>
+                        <a:latin typeface="+mn-lt"/>
+                        <a:ea typeface="+mn-ea"/>
+                        <a:cs typeface="+mn-cs"/>
+                      </a:endParaRPr>
+                    </a:p>
+                  </a:txBody>
+                  <a:tcPr/>
+                </a:tc>
+                <a:tc>
+                  <a:txBody>
+                    <a:bodyPr/>
+                    <a:lstStyle/>
+                    <a:p>
+                      <a:pPr lvl="0">
+                        <a:buNone/>
+                      </a:pPr>
+                      <a:r>
+                        <a:rPr lang="de-DE" sz="1100" dirty="0" err="1"/>
+                        <a:t>longitude</a:t>
+                      </a:r>
+                      <a:endParaRPr lang="de-DE" sz="1100" dirty="0"/>
+                    </a:p>
+                  </a:txBody>
+                  <a:tcPr/>
+                </a:tc>
+                <a:extLst>
+                  <a:ext uri="{0D108BD9-81ED-4DB2-BD59-A6C34878D82A}">
+                    <a16:rowId xmlns:a16="http://schemas.microsoft.com/office/drawing/2014/main" val="564853248"/>
+                  </a:ext>
+                </a:extLst>
+              </a:tr>
+              <a:tr h="158864">
+                <a:tc>
+                  <a:txBody>
+                    <a:bodyPr/>
+                    <a:lstStyle/>
+                    <a:p>
+                      <a:pPr lvl="0">
+                        <a:buNone/>
+                      </a:pPr>
+                      <a:r>
+                        <a:rPr lang="en-GB" sz="1100" kern="1200" dirty="0" err="1">
+                          <a:solidFill>
+                            <a:schemeClr val="lt1"/>
+                          </a:solidFill>
+                          <a:effectLst/>
+                          <a:latin typeface="+mn-lt"/>
+                          <a:ea typeface="+mn-ea"/>
+                          <a:cs typeface="+mn-cs"/>
+                        </a:rPr>
+                        <a:t>breite</a:t>
+                      </a:r>
+                      <a:endParaRPr lang="en-GB" sz="1100" kern="1200" dirty="0">
+                        <a:solidFill>
+                          <a:schemeClr val="lt1"/>
+                        </a:solidFill>
+                        <a:effectLst/>
+                        <a:latin typeface="+mn-lt"/>
+                        <a:ea typeface="+mn-ea"/>
+                        <a:cs typeface="+mn-cs"/>
+                      </a:endParaRPr>
+                    </a:p>
+                  </a:txBody>
+                  <a:tcPr/>
+                </a:tc>
+                <a:tc>
+                  <a:txBody>
+                    <a:bodyPr/>
+                    <a:lstStyle/>
+                    <a:p>
+                      <a:pPr lvl="0">
+                        <a:buNone/>
+                      </a:pPr>
+                      <a:r>
+                        <a:rPr lang="de-DE" sz="1100" dirty="0" err="1"/>
+                        <a:t>latitude</a:t>
+                      </a:r>
+                      <a:endParaRPr lang="de-DE" sz="1100" dirty="0"/>
+                    </a:p>
+                  </a:txBody>
+                  <a:tcPr/>
+                </a:tc>
+                <a:extLst>
+                  <a:ext uri="{0D108BD9-81ED-4DB2-BD59-A6C34878D82A}">
+                    <a16:rowId xmlns:a16="http://schemas.microsoft.com/office/drawing/2014/main" val="333557103"/>
+                  </a:ext>
+                </a:extLst>
+              </a:tr>
+              <a:tr h="158864">
+                <a:tc>
+                  <a:txBody>
+                    <a:bodyPr/>
+                    <a:lstStyle/>
+                    <a:p>
+                      <a:pPr lvl="0">
+                        <a:buNone/>
+                      </a:pPr>
+                      <a:r>
+                        <a:rPr lang="en-GB" sz="1100" kern="1200" dirty="0" err="1">
+                          <a:solidFill>
+                            <a:schemeClr val="lt1"/>
+                          </a:solidFill>
+                          <a:effectLst/>
+                          <a:latin typeface="+mn-lt"/>
+                          <a:ea typeface="+mn-ea"/>
+                          <a:cs typeface="+mn-cs"/>
+                        </a:rPr>
+                        <a:t>betreiberName</a:t>
+                      </a:r>
+                      <a:endParaRPr lang="en-GB" sz="1100" kern="1200" dirty="0">
+                        <a:solidFill>
+                          <a:schemeClr val="lt1"/>
+                        </a:solidFill>
+                        <a:effectLst/>
+                        <a:latin typeface="+mn-lt"/>
+                        <a:ea typeface="+mn-ea"/>
+                        <a:cs typeface="+mn-cs"/>
+                      </a:endParaRPr>
+                    </a:p>
+                  </a:txBody>
+                  <a:tcPr/>
+                </a:tc>
+                <a:tc>
+                  <a:txBody>
+                    <a:bodyPr/>
+                    <a:lstStyle/>
+                    <a:p>
+                      <a:pPr lvl="0">
+                        <a:buNone/>
+                      </a:pPr>
+                      <a:endParaRPr lang="de-DE" sz="1100" dirty="0"/>
+                    </a:p>
+                  </a:txBody>
+                  <a:tcPr/>
+                </a:tc>
+                <a:extLst>
+                  <a:ext uri="{0D108BD9-81ED-4DB2-BD59-A6C34878D82A}">
+                    <a16:rowId xmlns:a16="http://schemas.microsoft.com/office/drawing/2014/main" val="3522027246"/>
+                  </a:ext>
+                </a:extLst>
+              </a:tr>
+              <a:tr h="158864">
+                <a:tc>
+                  <a:txBody>
+                    <a:bodyPr/>
+                    <a:lstStyle/>
+                    <a:p>
+                      <a:pPr lvl="0">
+                        <a:buNone/>
+                      </a:pPr>
+                      <a:r>
+                        <a:rPr lang="en-GB" sz="1100" kern="1200" dirty="0" err="1">
+                          <a:solidFill>
+                            <a:schemeClr val="lt1"/>
+                          </a:solidFill>
+                          <a:effectLst/>
+                          <a:latin typeface="+mn-lt"/>
+                          <a:ea typeface="+mn-ea"/>
+                          <a:cs typeface="+mn-cs"/>
+                        </a:rPr>
+                        <a:t>betreiberNr</a:t>
+                      </a:r>
+                      <a:endParaRPr lang="en-GB" sz="1100" kern="1200" dirty="0">
+                        <a:solidFill>
+                          <a:schemeClr val="lt1"/>
+                        </a:solidFill>
+                        <a:effectLst/>
+                        <a:latin typeface="+mn-lt"/>
+                        <a:ea typeface="+mn-ea"/>
+                        <a:cs typeface="+mn-cs"/>
+                      </a:endParaRPr>
+                    </a:p>
+                  </a:txBody>
+                  <a:tcPr/>
+                </a:tc>
+                <a:tc>
+                  <a:txBody>
+                    <a:bodyPr/>
+                    <a:lstStyle/>
+                    <a:p>
+                      <a:pPr lvl="0">
+                        <a:buNone/>
+                      </a:pPr>
+                      <a:endParaRPr lang="de-DE" sz="1100" dirty="0"/>
+                    </a:p>
+                  </a:txBody>
+                  <a:tcPr/>
+                </a:tc>
+                <a:extLst>
+                  <a:ext uri="{0D108BD9-81ED-4DB2-BD59-A6C34878D82A}">
+                    <a16:rowId xmlns:a16="http://schemas.microsoft.com/office/drawing/2014/main" val="1593974417"/>
+                  </a:ext>
+                </a:extLst>
+              </a:tr>
+              <a:tr h="158864">
+                <a:tc>
+                  <a:txBody>
+                    <a:bodyPr/>
+                    <a:lstStyle/>
+                    <a:p>
+                      <a:pPr lvl="0">
+                        <a:buNone/>
+                      </a:pPr>
+                      <a:r>
+                        <a:rPr lang="en-GB" sz="1100" kern="1200" dirty="0">
+                          <a:solidFill>
+                            <a:schemeClr val="lt1"/>
+                          </a:solidFill>
+                          <a:effectLst/>
+                          <a:latin typeface="+mn-lt"/>
+                          <a:ea typeface="+mn-ea"/>
+                          <a:cs typeface="+mn-cs"/>
+                        </a:rPr>
+                        <a:t>status</a:t>
+                      </a:r>
+                    </a:p>
+                  </a:txBody>
+                  <a:tcPr/>
+                </a:tc>
+                <a:tc>
+                  <a:txBody>
+                    <a:bodyPr/>
+                    <a:lstStyle/>
+                    <a:p>
+                      <a:pPr lvl="0">
+                        <a:buNone/>
+                      </a:pPr>
+                      <a:endParaRPr lang="de-DE" sz="1100" dirty="0"/>
+                    </a:p>
+                  </a:txBody>
+                  <a:tcPr/>
+                </a:tc>
+                <a:extLst>
+                  <a:ext uri="{0D108BD9-81ED-4DB2-BD59-A6C34878D82A}">
+                    <a16:rowId xmlns:a16="http://schemas.microsoft.com/office/drawing/2014/main" val="2023565988"/>
+                  </a:ext>
+                </a:extLst>
+              </a:tr>
+            </a:tbl>
+          </a:graphicData>
+        </a:graphic>
+      </p:graphicFrame>
+      <p:graphicFrame>
+        <p:nvGraphicFramePr>
+          <p:cNvPr id="7" name="Tabelle 4">
+            <a:extLst>
+              <a:ext uri="{FF2B5EF4-FFF2-40B4-BE49-F238E27FC236}">
+                <a16:creationId xmlns:a16="http://schemas.microsoft.com/office/drawing/2014/main" id="{0C4CFADE-E38C-F621-51A1-588B493B813D}"/>
+              </a:ext>
+            </a:extLst>
+          </p:cNvPr>
+          <p:cNvGraphicFramePr>
+            <a:graphicFrameLocks noGrp="1"/>
+          </p:cNvGraphicFramePr>
+          <p:nvPr/>
+        </p:nvGraphicFramePr>
+        <p:xfrm>
+          <a:off x="358780" y="1141311"/>
+          <a:ext cx="3456384" cy="3794760"/>
+        </p:xfrm>
+        <a:graphic>
+          <a:graphicData uri="http://schemas.openxmlformats.org/drawingml/2006/table">
+            <a:tbl>
+              <a:tblPr firstRow="1" bandRow="1">
+                <a:tableStyleId>{E929F9F4-4A8F-4326-A1B4-22849713DDAB}</a:tableStyleId>
+              </a:tblPr>
+              <a:tblGrid>
+                <a:gridCol w="1836956">
+                  <a:extLst>
+                    <a:ext uri="{9D8B030D-6E8A-4147-A177-3AD203B41FA5}">
+                      <a16:colId xmlns:a16="http://schemas.microsoft.com/office/drawing/2014/main" val="726253425"/>
+                    </a:ext>
+                  </a:extLst>
+                </a:gridCol>
+                <a:gridCol w="1619428">
+                  <a:extLst>
+                    <a:ext uri="{9D8B030D-6E8A-4147-A177-3AD203B41FA5}">
+                      <a16:colId xmlns:a16="http://schemas.microsoft.com/office/drawing/2014/main" val="3954886685"/>
+                    </a:ext>
+                  </a:extLst>
+                </a:gridCol>
+              </a:tblGrid>
+              <a:tr h="216024">
+                <a:tc>
+                  <a:txBody>
+                    <a:bodyPr/>
+                    <a:lstStyle/>
+                    <a:p>
+                      <a:pPr lvl="0">
+                        <a:buNone/>
+                      </a:pPr>
+                      <a:r>
+                        <a:rPr lang="de-DE" sz="1100" dirty="0"/>
+                        <a:t>RMV Station </a:t>
+                      </a:r>
+                      <a:r>
+                        <a:rPr lang="de-DE" sz="1100" dirty="0">
+                          <a:sym typeface="Wingdings" pitchFamily="2" charset="2"/>
+                        </a:rPr>
+                        <a:t></a:t>
+                      </a:r>
+                      <a:endParaRPr lang="de-DE" sz="1100" dirty="0"/>
+                    </a:p>
+                  </a:txBody>
+                  <a:tcPr/>
+                </a:tc>
+                <a:tc>
+                  <a:txBody>
+                    <a:bodyPr/>
+                    <a:lstStyle/>
+                    <a:p>
+                      <a:r>
+                        <a:rPr lang="de-DE" sz="1100" dirty="0"/>
+                        <a:t>Integrated RMV Station</a:t>
+                      </a:r>
+                    </a:p>
+                  </a:txBody>
+                  <a:tcPr/>
+                </a:tc>
+                <a:extLst>
+                  <a:ext uri="{0D108BD9-81ED-4DB2-BD59-A6C34878D82A}">
+                    <a16:rowId xmlns:a16="http://schemas.microsoft.com/office/drawing/2014/main" val="747663864"/>
+                  </a:ext>
+                </a:extLst>
+              </a:tr>
+              <a:tr h="0">
+                <a:tc>
+                  <a:txBody>
+                    <a:bodyPr/>
+                    <a:lstStyle/>
+                    <a:p>
+                      <a:pPr lvl="0">
+                        <a:buNone/>
+                      </a:pPr>
+                      <a:r>
+                        <a:rPr lang="en-GB" sz="1100" kern="1200" dirty="0" err="1">
+                          <a:solidFill>
+                            <a:schemeClr val="lt1"/>
+                          </a:solidFill>
+                          <a:effectLst/>
+                          <a:latin typeface="+mn-lt"/>
+                          <a:ea typeface="+mn-ea"/>
+                          <a:cs typeface="+mn-cs"/>
+                        </a:rPr>
+                        <a:t>hafasId</a:t>
+                      </a:r>
+                      <a:endParaRPr lang="de-DE" sz="1100" dirty="0"/>
+                    </a:p>
+                  </a:txBody>
+                  <a:tcPr/>
+                </a:tc>
+                <a:tc>
+                  <a:txBody>
+                    <a:bodyPr/>
+                    <a:lstStyle/>
+                    <a:p>
+                      <a:pPr lvl="0">
+                        <a:buNone/>
+                      </a:pPr>
+                      <a:endParaRPr lang="de-DE" sz="1100" dirty="0"/>
+                    </a:p>
+                  </a:txBody>
+                  <a:tcPr/>
+                </a:tc>
+                <a:extLst>
+                  <a:ext uri="{0D108BD9-81ED-4DB2-BD59-A6C34878D82A}">
+                    <a16:rowId xmlns:a16="http://schemas.microsoft.com/office/drawing/2014/main" val="4074611531"/>
+                  </a:ext>
+                </a:extLst>
+              </a:tr>
+              <a:tr h="0">
+                <a:tc>
+                  <a:txBody>
+                    <a:bodyPr/>
+                    <a:lstStyle/>
+                    <a:p>
+                      <a:pPr lvl="0">
+                        <a:buNone/>
+                      </a:pPr>
+                      <a:r>
+                        <a:rPr lang="en-GB" sz="1100" kern="1200" dirty="0" err="1">
+                          <a:solidFill>
+                            <a:schemeClr val="lt1"/>
+                          </a:solidFill>
+                          <a:effectLst/>
+                          <a:latin typeface="+mn-lt"/>
+                          <a:ea typeface="+mn-ea"/>
+                          <a:cs typeface="+mn-cs"/>
+                        </a:rPr>
+                        <a:t>rmvId</a:t>
+                      </a:r>
+                      <a:endParaRPr lang="de-DE" sz="1100" dirty="0"/>
+                    </a:p>
+                  </a:txBody>
+                  <a:tcPr/>
+                </a:tc>
+                <a:tc>
+                  <a:txBody>
+                    <a:bodyPr/>
+                    <a:lstStyle/>
+                    <a:p>
+                      <a:pPr lvl="0">
+                        <a:buNone/>
+                      </a:pPr>
+                      <a:endParaRPr lang="de-DE" sz="1100" dirty="0"/>
+                    </a:p>
+                  </a:txBody>
+                  <a:tcPr/>
+                </a:tc>
+                <a:extLst>
+                  <a:ext uri="{0D108BD9-81ED-4DB2-BD59-A6C34878D82A}">
+                    <a16:rowId xmlns:a16="http://schemas.microsoft.com/office/drawing/2014/main" val="2152975387"/>
+                  </a:ext>
+                </a:extLst>
+              </a:tr>
+              <a:tr h="158864">
+                <a:tc>
+                  <a:txBody>
+                    <a:bodyPr/>
+                    <a:lstStyle/>
+                    <a:p>
+                      <a:pPr lvl="0">
+                        <a:buNone/>
+                      </a:pPr>
+                      <a:r>
+                        <a:rPr lang="en-GB" sz="1100" kern="1200" dirty="0" err="1">
+                          <a:solidFill>
+                            <a:schemeClr val="lt1"/>
+                          </a:solidFill>
+                          <a:effectLst/>
+                          <a:latin typeface="+mn-lt"/>
+                          <a:ea typeface="+mn-ea"/>
+                          <a:cs typeface="+mn-cs"/>
+                        </a:rPr>
+                        <a:t>dhid</a:t>
+                      </a:r>
+                      <a:endParaRPr lang="en-GB" sz="1100" kern="1200" dirty="0">
+                        <a:solidFill>
+                          <a:schemeClr val="lt1"/>
+                        </a:solidFill>
+                        <a:effectLst/>
+                        <a:latin typeface="+mn-lt"/>
+                        <a:ea typeface="+mn-ea"/>
+                        <a:cs typeface="+mn-cs"/>
+                      </a:endParaRPr>
+                    </a:p>
+                  </a:txBody>
+                  <a:tcPr/>
+                </a:tc>
+                <a:tc>
+                  <a:txBody>
+                    <a:bodyPr/>
+                    <a:lstStyle/>
+                    <a:p>
+                      <a:pPr lvl="0">
+                        <a:buNone/>
+                      </a:pPr>
+                      <a:r>
+                        <a:rPr lang="de-DE" sz="1100" dirty="0" err="1"/>
+                        <a:t>stationId</a:t>
+                      </a:r>
+                      <a:endParaRPr lang="de-DE" sz="1100" dirty="0"/>
+                    </a:p>
+                  </a:txBody>
+                  <a:tcPr/>
+                </a:tc>
+                <a:extLst>
+                  <a:ext uri="{0D108BD9-81ED-4DB2-BD59-A6C34878D82A}">
+                    <a16:rowId xmlns:a16="http://schemas.microsoft.com/office/drawing/2014/main" val="3195943143"/>
+                  </a:ext>
+                </a:extLst>
+              </a:tr>
+              <a:tr h="158864">
+                <a:tc>
+                  <a:txBody>
+                    <a:bodyPr/>
+                    <a:lstStyle/>
+                    <a:p>
+                      <a:pPr marL="0" marR="0" lvl="0" indent="0" algn="l" defTabSz="914310" rtl="0" eaLnBrk="1" fontAlgn="auto" latinLnBrk="0" hangingPunct="1">
+                        <a:lnSpc>
+                          <a:spcPct val="100000"/>
+                        </a:lnSpc>
+                        <a:spcBef>
+                          <a:spcPts val="0"/>
+                        </a:spcBef>
+                        <a:spcAft>
+                          <a:spcPts val="0"/>
+                        </a:spcAft>
+                        <a:buClrTx/>
+                        <a:buSzTx/>
+                        <a:buFontTx/>
+                        <a:buNone/>
+                        <a:tabLst/>
+                        <a:defRPr/>
+                      </a:pPr>
+                      <a:r>
+                        <a:rPr lang="en-GB" sz="1100" kern="1200" dirty="0" err="1">
+                          <a:solidFill>
+                            <a:schemeClr val="lt1"/>
+                          </a:solidFill>
+                          <a:effectLst/>
+                          <a:latin typeface="+mn-lt"/>
+                          <a:ea typeface="+mn-ea"/>
+                          <a:cs typeface="+mn-cs"/>
+                        </a:rPr>
+                        <a:t>hstName</a:t>
+                      </a:r>
+                      <a:endParaRPr lang="en-GB" sz="1100" kern="1200" dirty="0">
+                        <a:solidFill>
+                          <a:schemeClr val="lt1"/>
+                        </a:solidFill>
+                        <a:effectLst/>
+                        <a:latin typeface="+mn-lt"/>
+                        <a:ea typeface="+mn-ea"/>
+                        <a:cs typeface="+mn-cs"/>
+                      </a:endParaRPr>
+                    </a:p>
+                  </a:txBody>
+                  <a:tcPr/>
+                </a:tc>
+                <a:tc>
+                  <a:txBody>
+                    <a:bodyPr/>
+                    <a:lstStyle/>
+                    <a:p>
+                      <a:pPr marL="0" marR="0" lvl="0" indent="0" algn="l" defTabSz="914310" rtl="0" eaLnBrk="1" fontAlgn="auto" latinLnBrk="0" hangingPunct="1">
+                        <a:lnSpc>
+                          <a:spcPct val="100000"/>
+                        </a:lnSpc>
+                        <a:spcBef>
+                          <a:spcPts val="0"/>
+                        </a:spcBef>
+                        <a:spcAft>
+                          <a:spcPts val="0"/>
+                        </a:spcAft>
+                        <a:buClrTx/>
+                        <a:buSzTx/>
+                        <a:buFontTx/>
+                        <a:buNone/>
+                        <a:tabLst/>
+                        <a:defRPr/>
+                      </a:pPr>
+                      <a:r>
+                        <a:rPr lang="de-DE" sz="1100" dirty="0" err="1"/>
+                        <a:t>stationName</a:t>
+                      </a:r>
+                      <a:endParaRPr lang="de-DE" sz="1100" dirty="0"/>
+                    </a:p>
+                  </a:txBody>
+                  <a:tcPr/>
+                </a:tc>
+                <a:extLst>
+                  <a:ext uri="{0D108BD9-81ED-4DB2-BD59-A6C34878D82A}">
+                    <a16:rowId xmlns:a16="http://schemas.microsoft.com/office/drawing/2014/main" val="1993862976"/>
+                  </a:ext>
+                </a:extLst>
+              </a:tr>
+              <a:tr h="158864">
+                <a:tc>
+                  <a:txBody>
+                    <a:bodyPr/>
+                    <a:lstStyle/>
+                    <a:p>
+                      <a:pPr marL="0" marR="0" lvl="0" indent="0" algn="l" defTabSz="914310" rtl="0" eaLnBrk="1" fontAlgn="auto" latinLnBrk="0" hangingPunct="1">
+                        <a:lnSpc>
+                          <a:spcPct val="100000"/>
+                        </a:lnSpc>
+                        <a:spcBef>
+                          <a:spcPts val="0"/>
+                        </a:spcBef>
+                        <a:spcAft>
+                          <a:spcPts val="0"/>
+                        </a:spcAft>
+                        <a:buClrTx/>
+                        <a:buSzTx/>
+                        <a:buFontTx/>
+                        <a:buNone/>
+                        <a:tabLst/>
+                        <a:defRPr/>
+                      </a:pPr>
+                      <a:r>
+                        <a:rPr lang="en-GB" sz="1100" kern="1200" dirty="0" err="1">
+                          <a:solidFill>
+                            <a:schemeClr val="lt1"/>
+                          </a:solidFill>
+                          <a:effectLst/>
+                          <a:latin typeface="+mn-lt"/>
+                          <a:ea typeface="+mn-ea"/>
+                          <a:cs typeface="+mn-cs"/>
+                        </a:rPr>
+                        <a:t>nameFahrplan</a:t>
+                      </a:r>
+                      <a:endParaRPr lang="en-GB" sz="1100" kern="1200" dirty="0">
+                        <a:solidFill>
+                          <a:schemeClr val="lt1"/>
+                        </a:solidFill>
+                        <a:effectLst/>
+                        <a:latin typeface="+mn-lt"/>
+                        <a:ea typeface="+mn-ea"/>
+                        <a:cs typeface="+mn-cs"/>
+                      </a:endParaRPr>
+                    </a:p>
+                  </a:txBody>
+                  <a:tcPr/>
+                </a:tc>
+                <a:tc>
+                  <a:txBody>
+                    <a:bodyPr/>
+                    <a:lstStyle/>
+                    <a:p>
+                      <a:pPr lvl="0">
+                        <a:buNone/>
+                      </a:pPr>
+                      <a:endParaRPr lang="de-DE" sz="1100" dirty="0"/>
+                    </a:p>
+                  </a:txBody>
+                  <a:tcPr/>
+                </a:tc>
+                <a:extLst>
+                  <a:ext uri="{0D108BD9-81ED-4DB2-BD59-A6C34878D82A}">
+                    <a16:rowId xmlns:a16="http://schemas.microsoft.com/office/drawing/2014/main" val="271117908"/>
+                  </a:ext>
+                </a:extLst>
+              </a:tr>
+              <a:tr h="158864">
+                <a:tc>
+                  <a:txBody>
+                    <a:bodyPr/>
+                    <a:lstStyle/>
+                    <a:p>
+                      <a:pPr marL="0" marR="0" lvl="0" indent="0" algn="l" defTabSz="914310" rtl="0" eaLnBrk="1" fontAlgn="auto" latinLnBrk="0" hangingPunct="1">
+                        <a:lnSpc>
+                          <a:spcPct val="100000"/>
+                        </a:lnSpc>
+                        <a:spcBef>
+                          <a:spcPts val="0"/>
+                        </a:spcBef>
+                        <a:spcAft>
+                          <a:spcPts val="0"/>
+                        </a:spcAft>
+                        <a:buClrTx/>
+                        <a:buSzTx/>
+                        <a:buFontTx/>
+                        <a:buNone/>
+                        <a:tabLst/>
+                        <a:defRPr/>
+                      </a:pPr>
+                      <a:r>
+                        <a:rPr lang="en-GB" sz="1100" kern="1200" dirty="0" err="1">
+                          <a:solidFill>
+                            <a:schemeClr val="lt1"/>
+                          </a:solidFill>
+                          <a:effectLst/>
+                          <a:latin typeface="+mn-lt"/>
+                          <a:ea typeface="+mn-ea"/>
+                          <a:cs typeface="+mn-cs"/>
+                        </a:rPr>
+                        <a:t>xIplWert</a:t>
+                      </a:r>
+                      <a:r>
+                        <a:rPr lang="en-GB" sz="1100" kern="1200" dirty="0">
+                          <a:solidFill>
+                            <a:schemeClr val="lt1"/>
+                          </a:solidFill>
+                          <a:effectLst/>
+                          <a:latin typeface="+mn-lt"/>
+                          <a:ea typeface="+mn-ea"/>
+                          <a:cs typeface="+mn-cs"/>
+                        </a:rPr>
+                        <a:t>, </a:t>
+                      </a:r>
+                      <a:r>
+                        <a:rPr lang="en-GB" sz="1100" kern="1200" dirty="0" err="1">
+                          <a:solidFill>
+                            <a:schemeClr val="lt1"/>
+                          </a:solidFill>
+                          <a:effectLst/>
+                          <a:latin typeface="+mn-lt"/>
+                          <a:ea typeface="+mn-ea"/>
+                          <a:cs typeface="+mn-cs"/>
+                        </a:rPr>
+                        <a:t>yIplWert</a:t>
+                      </a:r>
+                      <a:endParaRPr lang="en-GB" sz="1100" kern="1200" dirty="0">
+                        <a:solidFill>
+                          <a:schemeClr val="lt1"/>
+                        </a:solidFill>
+                        <a:effectLst/>
+                        <a:latin typeface="+mn-lt"/>
+                        <a:ea typeface="+mn-ea"/>
+                        <a:cs typeface="+mn-cs"/>
+                      </a:endParaRPr>
+                    </a:p>
+                  </a:txBody>
+                  <a:tcPr/>
+                </a:tc>
+                <a:tc>
+                  <a:txBody>
+                    <a:bodyPr/>
+                    <a:lstStyle/>
+                    <a:p>
+                      <a:pPr lvl="0">
+                        <a:buNone/>
+                      </a:pPr>
+                      <a:r>
+                        <a:rPr lang="de-DE" sz="1100" dirty="0" err="1"/>
+                        <a:t>longitude</a:t>
+                      </a:r>
+                      <a:endParaRPr lang="de-DE" sz="1100" dirty="0"/>
+                    </a:p>
+                  </a:txBody>
+                  <a:tcPr/>
+                </a:tc>
+                <a:extLst>
+                  <a:ext uri="{0D108BD9-81ED-4DB2-BD59-A6C34878D82A}">
+                    <a16:rowId xmlns:a16="http://schemas.microsoft.com/office/drawing/2014/main" val="564853248"/>
+                  </a:ext>
+                </a:extLst>
+              </a:tr>
+              <a:tr h="158864">
+                <a:tc>
+                  <a:txBody>
+                    <a:bodyPr/>
+                    <a:lstStyle/>
+                    <a:p>
+                      <a:pPr marL="0" marR="0" lvl="0" indent="0" algn="l" defTabSz="914310" rtl="0" eaLnBrk="1" fontAlgn="auto" latinLnBrk="0" hangingPunct="1">
+                        <a:lnSpc>
+                          <a:spcPct val="100000"/>
+                        </a:lnSpc>
+                        <a:spcBef>
+                          <a:spcPts val="0"/>
+                        </a:spcBef>
+                        <a:spcAft>
+                          <a:spcPts val="0"/>
+                        </a:spcAft>
+                        <a:buClrTx/>
+                        <a:buSzTx/>
+                        <a:buFontTx/>
+                        <a:buNone/>
+                        <a:tabLst/>
+                        <a:defRPr/>
+                      </a:pPr>
+                      <a:r>
+                        <a:rPr lang="en-GB" sz="1100" kern="1200" dirty="0">
+                          <a:solidFill>
+                            <a:schemeClr val="lt1"/>
+                          </a:solidFill>
+                          <a:effectLst/>
+                          <a:latin typeface="+mn-lt"/>
+                          <a:ea typeface="+mn-ea"/>
+                          <a:cs typeface="+mn-cs"/>
+                        </a:rPr>
+                        <a:t>xWgs84, yWgs85</a:t>
+                      </a:r>
+                    </a:p>
+                  </a:txBody>
+                  <a:tcPr/>
+                </a:tc>
+                <a:tc>
+                  <a:txBody>
+                    <a:bodyPr/>
+                    <a:lstStyle/>
+                    <a:p>
+                      <a:pPr lvl="0">
+                        <a:buNone/>
+                      </a:pPr>
+                      <a:r>
+                        <a:rPr lang="de-DE" sz="1100" dirty="0" err="1"/>
+                        <a:t>longitude</a:t>
+                      </a:r>
+                      <a:r>
+                        <a:rPr lang="de-DE" sz="1100" dirty="0"/>
+                        <a:t>, </a:t>
+                      </a:r>
+                      <a:r>
+                        <a:rPr lang="de-DE" sz="1100" dirty="0" err="1"/>
+                        <a:t>latitude</a:t>
+                      </a:r>
+                      <a:endParaRPr lang="de-DE" sz="1100" dirty="0"/>
+                    </a:p>
+                  </a:txBody>
+                  <a:tcPr/>
+                </a:tc>
+                <a:extLst>
+                  <a:ext uri="{0D108BD9-81ED-4DB2-BD59-A6C34878D82A}">
+                    <a16:rowId xmlns:a16="http://schemas.microsoft.com/office/drawing/2014/main" val="333557103"/>
+                  </a:ext>
+                </a:extLst>
+              </a:tr>
+              <a:tr h="158864">
+                <a:tc>
+                  <a:txBody>
+                    <a:bodyPr/>
+                    <a:lstStyle/>
+                    <a:p>
+                      <a:pPr lvl="0">
+                        <a:buNone/>
+                      </a:pPr>
+                      <a:r>
+                        <a:rPr lang="en-GB" sz="1100" kern="1200" dirty="0" err="1">
+                          <a:solidFill>
+                            <a:schemeClr val="lt1"/>
+                          </a:solidFill>
+                          <a:effectLst/>
+                          <a:latin typeface="+mn-lt"/>
+                          <a:ea typeface="+mn-ea"/>
+                          <a:cs typeface="+mn-cs"/>
+                        </a:rPr>
+                        <a:t>lno</a:t>
+                      </a:r>
+                      <a:endParaRPr lang="en-GB" sz="1100" kern="1200" dirty="0">
+                        <a:solidFill>
+                          <a:schemeClr val="lt1"/>
+                        </a:solidFill>
+                        <a:effectLst/>
+                        <a:latin typeface="+mn-lt"/>
+                        <a:ea typeface="+mn-ea"/>
+                        <a:cs typeface="+mn-cs"/>
+                      </a:endParaRPr>
+                    </a:p>
+                  </a:txBody>
+                  <a:tcPr/>
+                </a:tc>
+                <a:tc>
+                  <a:txBody>
+                    <a:bodyPr/>
+                    <a:lstStyle/>
+                    <a:p>
+                      <a:pPr lvl="0">
+                        <a:buNone/>
+                      </a:pPr>
+                      <a:endParaRPr lang="de-DE" sz="1100" dirty="0"/>
+                    </a:p>
+                  </a:txBody>
+                  <a:tcPr/>
+                </a:tc>
+                <a:extLst>
+                  <a:ext uri="{0D108BD9-81ED-4DB2-BD59-A6C34878D82A}">
+                    <a16:rowId xmlns:a16="http://schemas.microsoft.com/office/drawing/2014/main" val="3522027246"/>
+                  </a:ext>
+                </a:extLst>
+              </a:tr>
+              <a:tr h="158864">
+                <a:tc>
+                  <a:txBody>
+                    <a:bodyPr/>
+                    <a:lstStyle/>
+                    <a:p>
+                      <a:pPr lvl="0">
+                        <a:buNone/>
+                      </a:pPr>
+                      <a:r>
+                        <a:rPr lang="en-GB" sz="1100" kern="1200" dirty="0" err="1">
+                          <a:solidFill>
+                            <a:schemeClr val="lt1"/>
+                          </a:solidFill>
+                          <a:effectLst/>
+                          <a:latin typeface="+mn-lt"/>
+                          <a:ea typeface="+mn-ea"/>
+                          <a:cs typeface="+mn-cs"/>
+                        </a:rPr>
+                        <a:t>gueltigAb</a:t>
+                      </a:r>
+                      <a:r>
+                        <a:rPr lang="en-GB" sz="1100" kern="1200" dirty="0">
+                          <a:solidFill>
+                            <a:schemeClr val="lt1"/>
+                          </a:solidFill>
+                          <a:effectLst/>
+                          <a:latin typeface="+mn-lt"/>
+                          <a:ea typeface="+mn-ea"/>
+                          <a:cs typeface="+mn-cs"/>
+                        </a:rPr>
+                        <a:t>, </a:t>
+                      </a:r>
+                      <a:r>
+                        <a:rPr lang="en-GB" sz="1100" kern="1200" dirty="0" err="1">
+                          <a:solidFill>
+                            <a:schemeClr val="lt1"/>
+                          </a:solidFill>
+                          <a:effectLst/>
+                          <a:latin typeface="+mn-lt"/>
+                          <a:ea typeface="+mn-ea"/>
+                          <a:cs typeface="+mn-cs"/>
+                        </a:rPr>
+                        <a:t>gueltigBis</a:t>
+                      </a:r>
+                      <a:endParaRPr lang="en-GB" sz="1100" kern="1200" dirty="0">
+                        <a:solidFill>
+                          <a:schemeClr val="lt1"/>
+                        </a:solidFill>
+                        <a:effectLst/>
+                        <a:latin typeface="+mn-lt"/>
+                        <a:ea typeface="+mn-ea"/>
+                        <a:cs typeface="+mn-cs"/>
+                      </a:endParaRPr>
+                    </a:p>
+                  </a:txBody>
+                  <a:tcPr/>
+                </a:tc>
+                <a:tc>
+                  <a:txBody>
+                    <a:bodyPr/>
+                    <a:lstStyle/>
+                    <a:p>
+                      <a:pPr lvl="0">
+                        <a:buNone/>
+                      </a:pPr>
+                      <a:endParaRPr lang="de-DE" sz="1100" dirty="0"/>
+                    </a:p>
+                  </a:txBody>
+                  <a:tcPr/>
+                </a:tc>
+                <a:extLst>
+                  <a:ext uri="{0D108BD9-81ED-4DB2-BD59-A6C34878D82A}">
+                    <a16:rowId xmlns:a16="http://schemas.microsoft.com/office/drawing/2014/main" val="1593974417"/>
+                  </a:ext>
+                </a:extLst>
+              </a:tr>
+              <a:tr h="158864">
+                <a:tc>
+                  <a:txBody>
+                    <a:bodyPr/>
+                    <a:lstStyle/>
+                    <a:p>
+                      <a:pPr lvl="0">
+                        <a:buNone/>
+                      </a:pPr>
+                      <a:r>
+                        <a:rPr lang="en-GB" sz="1100" kern="1200" dirty="0">
+                          <a:solidFill>
+                            <a:schemeClr val="lt1"/>
+                          </a:solidFill>
+                          <a:effectLst/>
+                          <a:latin typeface="+mn-lt"/>
+                          <a:ea typeface="+mn-ea"/>
+                          <a:cs typeface="+mn-cs"/>
+                        </a:rPr>
+                        <a:t>verbund1IstgleichRmv</a:t>
+                      </a:r>
+                    </a:p>
+                  </a:txBody>
+                  <a:tcPr/>
+                </a:tc>
+                <a:tc>
+                  <a:txBody>
+                    <a:bodyPr/>
+                    <a:lstStyle/>
+                    <a:p>
+                      <a:pPr lvl="0">
+                        <a:buNone/>
+                      </a:pPr>
+                      <a:endParaRPr lang="de-DE" sz="1100" dirty="0"/>
+                    </a:p>
+                  </a:txBody>
+                  <a:tcPr/>
+                </a:tc>
+                <a:extLst>
+                  <a:ext uri="{0D108BD9-81ED-4DB2-BD59-A6C34878D82A}">
+                    <a16:rowId xmlns:a16="http://schemas.microsoft.com/office/drawing/2014/main" val="2023565988"/>
+                  </a:ext>
+                </a:extLst>
+              </a:tr>
+              <a:tr h="158864">
+                <a:tc>
+                  <a:txBody>
+                    <a:bodyPr/>
+                    <a:lstStyle/>
+                    <a:p>
+                      <a:pPr lvl="0">
+                        <a:buNone/>
+                      </a:pPr>
+                      <a:r>
+                        <a:rPr lang="en-GB" sz="1100" kern="1200" dirty="0" err="1">
+                          <a:solidFill>
+                            <a:schemeClr val="lt1"/>
+                          </a:solidFill>
+                          <a:effectLst/>
+                          <a:latin typeface="+mn-lt"/>
+                          <a:ea typeface="+mn-ea"/>
+                          <a:cs typeface="+mn-cs"/>
+                        </a:rPr>
+                        <a:t>gemeindename</a:t>
+                      </a:r>
+                      <a:endParaRPr lang="en-GB" sz="1100" kern="1200" dirty="0">
+                        <a:solidFill>
+                          <a:schemeClr val="lt1"/>
+                        </a:solidFill>
+                        <a:effectLst/>
+                        <a:latin typeface="+mn-lt"/>
+                        <a:ea typeface="+mn-ea"/>
+                        <a:cs typeface="+mn-cs"/>
+                      </a:endParaRPr>
+                    </a:p>
+                  </a:txBody>
+                  <a:tcPr/>
+                </a:tc>
+                <a:tc>
+                  <a:txBody>
+                    <a:bodyPr/>
+                    <a:lstStyle/>
+                    <a:p>
+                      <a:pPr lvl="0">
+                        <a:buNone/>
+                      </a:pPr>
+                      <a:r>
+                        <a:rPr lang="de-DE" sz="1100" dirty="0" err="1"/>
+                        <a:t>cityName</a:t>
+                      </a:r>
+                      <a:endParaRPr lang="de-DE" sz="1100" dirty="0"/>
+                    </a:p>
+                  </a:txBody>
+                  <a:tcPr/>
+                </a:tc>
+                <a:extLst>
+                  <a:ext uri="{0D108BD9-81ED-4DB2-BD59-A6C34878D82A}">
+                    <a16:rowId xmlns:a16="http://schemas.microsoft.com/office/drawing/2014/main" val="737867765"/>
+                  </a:ext>
+                </a:extLst>
+              </a:tr>
+              <a:tr h="158864">
+                <a:tc>
+                  <a:txBody>
+                    <a:bodyPr/>
+                    <a:lstStyle/>
+                    <a:p>
+                      <a:pPr marL="0" marR="0" lvl="0" indent="0" algn="l" defTabSz="914310" rtl="0" eaLnBrk="1" fontAlgn="auto" latinLnBrk="0" hangingPunct="1">
+                        <a:lnSpc>
+                          <a:spcPct val="100000"/>
+                        </a:lnSpc>
+                        <a:spcBef>
+                          <a:spcPts val="0"/>
+                        </a:spcBef>
+                        <a:spcAft>
+                          <a:spcPts val="0"/>
+                        </a:spcAft>
+                        <a:buClrTx/>
+                        <a:buSzTx/>
+                        <a:buFontTx/>
+                        <a:buNone/>
+                        <a:tabLst/>
+                        <a:defRPr/>
+                      </a:pPr>
+                      <a:r>
+                        <a:rPr lang="en-GB" sz="1100" kern="1200" dirty="0">
+                          <a:solidFill>
+                            <a:schemeClr val="lt1"/>
+                          </a:solidFill>
+                          <a:effectLst/>
+                          <a:latin typeface="+mn-lt"/>
+                          <a:ea typeface="+mn-ea"/>
+                          <a:cs typeface="+mn-cs"/>
+                        </a:rPr>
+                        <a:t>land, </a:t>
+                      </a:r>
+                      <a:r>
+                        <a:rPr lang="en-GB" sz="1100" kern="1200" dirty="0" err="1">
+                          <a:solidFill>
+                            <a:schemeClr val="lt1"/>
+                          </a:solidFill>
+                          <a:effectLst/>
+                          <a:latin typeface="+mn-lt"/>
+                          <a:ea typeface="+mn-ea"/>
+                          <a:cs typeface="+mn-cs"/>
+                        </a:rPr>
+                        <a:t>rp</a:t>
+                      </a:r>
+                      <a:r>
+                        <a:rPr lang="en-GB" sz="1100" kern="1200" dirty="0">
+                          <a:solidFill>
+                            <a:schemeClr val="lt1"/>
+                          </a:solidFill>
+                          <a:effectLst/>
+                          <a:latin typeface="+mn-lt"/>
+                          <a:ea typeface="+mn-ea"/>
+                          <a:cs typeface="+mn-cs"/>
+                        </a:rPr>
+                        <a:t>, </a:t>
+                      </a:r>
+                      <a:r>
+                        <a:rPr lang="en-GB" sz="1100" kern="1200" dirty="0" err="1">
+                          <a:solidFill>
+                            <a:schemeClr val="lt1"/>
+                          </a:solidFill>
+                          <a:effectLst/>
+                          <a:latin typeface="+mn-lt"/>
+                          <a:ea typeface="+mn-ea"/>
+                          <a:cs typeface="+mn-cs"/>
+                        </a:rPr>
+                        <a:t>ortsteilname</a:t>
+                      </a:r>
+                      <a:endParaRPr lang="en-GB" sz="1100" kern="1200" dirty="0">
+                        <a:solidFill>
+                          <a:schemeClr val="lt1"/>
+                        </a:solidFill>
+                        <a:effectLst/>
+                        <a:latin typeface="+mn-lt"/>
+                        <a:ea typeface="+mn-ea"/>
+                        <a:cs typeface="+mn-cs"/>
+                      </a:endParaRPr>
+                    </a:p>
+                  </a:txBody>
+                  <a:tcPr/>
+                </a:tc>
+                <a:tc>
+                  <a:txBody>
+                    <a:bodyPr/>
+                    <a:lstStyle/>
+                    <a:p>
+                      <a:pPr lvl="0">
+                        <a:buNone/>
+                      </a:pPr>
+                      <a:endParaRPr lang="de-DE" sz="1100" dirty="0"/>
+                    </a:p>
+                  </a:txBody>
+                  <a:tcPr/>
+                </a:tc>
+                <a:extLst>
+                  <a:ext uri="{0D108BD9-81ED-4DB2-BD59-A6C34878D82A}">
+                    <a16:rowId xmlns:a16="http://schemas.microsoft.com/office/drawing/2014/main" val="2739212574"/>
+                  </a:ext>
+                </a:extLst>
+              </a:tr>
+              <a:tr h="158864">
+                <a:tc>
+                  <a:txBody>
+                    <a:bodyPr/>
+                    <a:lstStyle/>
+                    <a:p>
+                      <a:pPr lvl="0">
+                        <a:buNone/>
+                      </a:pPr>
+                      <a:r>
+                        <a:rPr lang="en-GB" sz="1100" kern="1200" dirty="0" err="1">
+                          <a:solidFill>
+                            <a:schemeClr val="lt1"/>
+                          </a:solidFill>
+                          <a:effectLst/>
+                          <a:latin typeface="+mn-lt"/>
+                          <a:ea typeface="+mn-ea"/>
+                          <a:cs typeface="+mn-cs"/>
+                        </a:rPr>
+                        <a:t>ags</a:t>
+                      </a:r>
+                      <a:r>
+                        <a:rPr lang="en-GB" sz="1100" kern="1200" dirty="0">
+                          <a:solidFill>
+                            <a:schemeClr val="lt1"/>
+                          </a:solidFill>
+                          <a:effectLst/>
+                          <a:latin typeface="+mn-lt"/>
+                          <a:ea typeface="+mn-ea"/>
+                          <a:cs typeface="+mn-cs"/>
+                        </a:rPr>
+                        <a:t> values </a:t>
+                      </a:r>
+                    </a:p>
+                  </a:txBody>
+                  <a:tcPr/>
+                </a:tc>
+                <a:tc>
+                  <a:txBody>
+                    <a:bodyPr/>
+                    <a:lstStyle/>
+                    <a:p>
+                      <a:pPr lvl="0">
+                        <a:buNone/>
+                      </a:pPr>
+                      <a:endParaRPr lang="de-DE" sz="1100" dirty="0"/>
+                    </a:p>
+                  </a:txBody>
+                  <a:tcPr/>
+                </a:tc>
+                <a:extLst>
+                  <a:ext uri="{0D108BD9-81ED-4DB2-BD59-A6C34878D82A}">
+                    <a16:rowId xmlns:a16="http://schemas.microsoft.com/office/drawing/2014/main" val="378163823"/>
+                  </a:ext>
+                </a:extLst>
+              </a:tr>
+            </a:tbl>
+          </a:graphicData>
+        </a:graphic>
+      </p:graphicFrame>
+    </p:spTree>
+    <p:extLst>
+      <p:ext uri="{BB962C8B-B14F-4D97-AF65-F5344CB8AC3E}">
+        <p14:creationId xmlns:p14="http://schemas.microsoft.com/office/powerpoint/2010/main" val="3440548608"/>
+      </p:ext>
+    </p:extLst>
+  </p:cSld>
+  <p:clrMapOvr>
+    <a:masterClrMapping/>
+  </p:clrMapOvr>
+</p:sld>
+</file>
+
+<file path=ppt/slides/slide6.xml><?xml version="1.0" encoding="utf-8"?>
+<p:sld xmlns:a="http://schemas.openxmlformats.org/drawingml/2006/main" xmlns:r="http://schemas.openxmlformats.org/officeDocument/2006/relationships" xmlns:p="http://schemas.openxmlformats.org/presentationml/2006/main">
+  <p:cSld>
+    <p:spTree>
+      <p:nvGrpSpPr>
+        <p:cNvPr id="1" name=""/>
+        <p:cNvGrpSpPr/>
+        <p:nvPr/>
+      </p:nvGrpSpPr>
+      <p:grpSpPr>
+        <a:xfrm>
+          <a:off x="0" y="0"/>
+          <a:ext cx="0" cy="0"/>
+          <a:chOff x="0" y="0"/>
+          <a:chExt cx="0" cy="0"/>
+        </a:xfrm>
+      </p:grpSpPr>
+      <p:sp>
+        <p:nvSpPr>
           <p:cNvPr id="2" name="Text Placeholder 1">
             <a:extLst>
               <a:ext uri="{FF2B5EF4-FFF2-40B4-BE49-F238E27FC236}">
@@ -27246,12 +29046,192 @@
               <a:buFont typeface="Arial,Sans-Serif"/>
               <a:buChar char="•"/>
             </a:pPr>
-            <a:endParaRPr lang="en-GB" dirty="0">
+            <a:r>
+              <a:rPr lang="en-GB" dirty="0"/>
+              <a:t>For each DB station we search for RMV stations in the same city</a:t>
+            </a:r>
+            <a:endParaRPr lang="en-GB">
               <a:ea typeface="Verdana"/>
             </a:endParaRPr>
           </a:p>
-        </p:txBody>
-      </p:sp>
+          <a:p>
+            <a:pPr marL="285750" indent="-285750">
+              <a:buFont typeface="Arial,Sans-Serif"/>
+              <a:buChar char="•"/>
+            </a:pPr>
+            <a:r>
+              <a:rPr lang="en-GB" dirty="0"/>
+              <a:t>One word city names like 'Marburg' are easy wins</a:t>
+            </a:r>
+            <a:endParaRPr lang="en-US"/>
+          </a:p>
+          <a:p>
+            <a:pPr marL="285750" indent="-285750">
+              <a:buFont typeface="Arial,Sans-Serif"/>
+              <a:buChar char="•"/>
+            </a:pPr>
+            <a:r>
+              <a:rPr lang="en-GB" dirty="0"/>
+              <a:t>Cities like 'Frankfurt </a:t>
+            </a:r>
+            <a:r>
+              <a:rPr lang="en-GB" dirty="0" err="1"/>
+              <a:t>a.M.</a:t>
+            </a:r>
+            <a:r>
+              <a:rPr lang="en-GB" dirty="0"/>
+              <a:t>' have different string representations</a:t>
+            </a:r>
+            <a:endParaRPr lang="en-US"/>
+          </a:p>
+          <a:p>
+            <a:pPr marL="285750" indent="-285750">
+              <a:buFont typeface="Arial,Sans-Serif"/>
+              <a:buChar char="•"/>
+            </a:pPr>
+            <a:r>
+              <a:rPr lang="en-GB" dirty="0"/>
+              <a:t>If no exact match is found candidates are searched and best is used</a:t>
+            </a:r>
+            <a:endParaRPr lang="en-US" dirty="0"/>
+          </a:p>
+          <a:p>
+            <a:pPr marL="359410" lvl="2" indent="-180340">
+              <a:buClr>
+                <a:srgbClr val="B1063A"/>
+              </a:buClr>
+              <a:buFont typeface="Arial,Sans-Serif"/>
+              <a:buChar char="•"/>
+            </a:pPr>
+            <a:r>
+              <a:rPr lang="en-GB" dirty="0"/>
+              <a:t>Candidates...</a:t>
+            </a:r>
+            <a:endParaRPr lang="en-US">
+              <a:ea typeface="Verdana"/>
+            </a:endParaRPr>
+          </a:p>
+          <a:p>
+            <a:pPr marL="537845" lvl="3" indent="-180340">
+              <a:buClr>
+                <a:srgbClr val="B1063A"/>
+              </a:buClr>
+              <a:buFont typeface="Arial,Sans-Serif"/>
+              <a:buChar char="•"/>
+            </a:pPr>
+            <a:r>
+              <a:rPr lang="en-GB" dirty="0"/>
+              <a:t>… have common 4 char prefix</a:t>
+            </a:r>
+            <a:endParaRPr lang="en-US" dirty="0">
+              <a:ea typeface="Verdana"/>
+            </a:endParaRPr>
+          </a:p>
+          <a:p>
+            <a:pPr marL="537845" lvl="3" indent="-180340">
+              <a:buFont typeface="Arial,Sans-Serif"/>
+              <a:buChar char="•"/>
+            </a:pPr>
+            <a:r>
+              <a:rPr lang="en-GB" dirty="0"/>
+              <a:t>… have a </a:t>
+            </a:r>
+            <a:r>
+              <a:rPr lang="en-GB" dirty="0" err="1"/>
+              <a:t>Levenshtein</a:t>
+            </a:r>
+            <a:r>
+              <a:rPr lang="en-GB" dirty="0"/>
+              <a:t> distance below 6</a:t>
+            </a:r>
+            <a:endParaRPr lang="en-US" dirty="0"/>
+          </a:p>
+        </p:txBody>
+      </p:sp>
+      <p:sp>
+        <p:nvSpPr>
+          <p:cNvPr id="3" name="Title 2">
+            <a:extLst>
+              <a:ext uri="{FF2B5EF4-FFF2-40B4-BE49-F238E27FC236}">
+                <a16:creationId xmlns:a16="http://schemas.microsoft.com/office/drawing/2014/main" id="{F7F75A12-7548-59F4-2464-2142F1452B6E}"/>
+              </a:ext>
+            </a:extLst>
+          </p:cNvPr>
+          <p:cNvSpPr>
+            <a:spLocks noGrp="1"/>
+          </p:cNvSpPr>
+          <p:nvPr>
+            <p:ph type="title"/>
+          </p:nvPr>
+        </p:nvSpPr>
+        <p:spPr/>
+        <p:txBody>
+          <a:bodyPr/>
+          <a:lstStyle/>
+          <a:p>
+            <a:r>
+              <a:rPr lang="de-DE" dirty="0"/>
+              <a:t>Clustering </a:t>
+            </a:r>
+            <a:r>
+              <a:rPr lang="de-DE" dirty="0" err="1"/>
+              <a:t>by</a:t>
+            </a:r>
+            <a:r>
+              <a:rPr lang="de-DE" dirty="0"/>
+              <a:t> </a:t>
+            </a:r>
+            <a:r>
+              <a:rPr lang="de-DE" dirty="0" err="1"/>
+              <a:t>city</a:t>
+            </a:r>
+            <a:r>
+              <a:rPr lang="de-DE" dirty="0"/>
+              <a:t> </a:t>
+            </a:r>
+            <a:r>
+              <a:rPr lang="de-DE" dirty="0" err="1"/>
+              <a:t>names</a:t>
+            </a:r>
+            <a:endParaRPr lang="en-US" dirty="0" err="1"/>
+          </a:p>
+          <a:p>
+            <a:endParaRPr lang="en-DE" dirty="0">
+              <a:ea typeface="Verdana"/>
+            </a:endParaRPr>
+          </a:p>
+        </p:txBody>
+      </p:sp>
+    </p:spTree>
+    <p:extLst>
+      <p:ext uri="{BB962C8B-B14F-4D97-AF65-F5344CB8AC3E}">
+        <p14:creationId xmlns:p14="http://schemas.microsoft.com/office/powerpoint/2010/main" val="198905625"/>
+      </p:ext>
+    </p:extLst>
+  </p:cSld>
+  <p:clrMapOvr>
+    <a:masterClrMapping/>
+  </p:clrMapOvr>
+</p:sld>
+</file>
+
+<file path=ppt/slides/slide7.xml><?xml version="1.0" encoding="utf-8"?>
+<p:sld xmlns:a="http://schemas.openxmlformats.org/drawingml/2006/main" xmlns:r="http://schemas.openxmlformats.org/officeDocument/2006/relationships" xmlns:p="http://schemas.openxmlformats.org/presentationml/2006/main">
+  <p:cSld>
+    <p:spTree>
+      <p:nvGrpSpPr>
+        <p:cNvPr id="1" name=""/>
+        <p:cNvGrpSpPr/>
+        <p:nvPr/>
+      </p:nvGrpSpPr>
+      <p:grpSpPr>
+        <a:xfrm>
+          <a:off x="0" y="0"/>
+          <a:ext cx="0" cy="0"/>
+          <a:chOff x="0" y="0"/>
+          <a:chExt cx="0" cy="0"/>
+        </a:xfrm>
+      </p:grpSpPr>
       <p:sp>
         <p:nvSpPr>
           <p:cNvPr id="3" name="Title 2">
@@ -27542,7 +29522,7 @@
 </p:sld>
 </file>
 
-<file path=ppt/slides/slide5.xml><?xml version="1.0" encoding="utf-8"?>
+<file path=ppt/slides/slide8.xml><?xml version="1.0" encoding="utf-8"?>
 <p:sld xmlns:a="http://schemas.openxmlformats.org/drawingml/2006/main" xmlns:r="http://schemas.openxmlformats.org/officeDocument/2006/relationships" xmlns:p="http://schemas.openxmlformats.org/presentationml/2006/main">
   <p:cSld>
     <p:spTree>
@@ -27775,7 +29755,7 @@
 </p:sld>
 </file>
 
-<file path=ppt/slides/slide6.xml><?xml version="1.0" encoding="utf-8"?>
+<file path=ppt/slides/slide9.xml><?xml version="1.0" encoding="utf-8"?>
 <p:sld xmlns:a="http://schemas.openxmlformats.org/drawingml/2006/main" xmlns:r="http://schemas.openxmlformats.org/officeDocument/2006/relationships" xmlns:p="http://schemas.openxmlformats.org/presentationml/2006/main">
   <p:cSld>
     <p:spTree>

</xml_diff>